<commit_message>
Organização do README e escrita da Agenda e Introdução da apresentação.
</commit_message>
<xml_diff>
--- a/apresentacao/Apresentação.pptx
+++ b/apresentacao/Apresentação.pptx
@@ -5,12 +5,19 @@
     <p:sldMasterId id="2147483747" r:id="rId1"/>
   </p:sldMasterIdLst>
   <p:notesMasterIdLst>
-    <p:notesMasterId r:id="rId5"/>
+    <p:notesMasterId r:id="rId12"/>
   </p:notesMasterIdLst>
   <p:sldIdLst>
     <p:sldId id="256" r:id="rId2"/>
-    <p:sldId id="257" r:id="rId3"/>
-    <p:sldId id="353" r:id="rId4"/>
+    <p:sldId id="355" r:id="rId3"/>
+    <p:sldId id="257" r:id="rId4"/>
+    <p:sldId id="356" r:id="rId5"/>
+    <p:sldId id="361" r:id="rId6"/>
+    <p:sldId id="357" r:id="rId7"/>
+    <p:sldId id="358" r:id="rId8"/>
+    <p:sldId id="359" r:id="rId9"/>
+    <p:sldId id="360" r:id="rId10"/>
+    <p:sldId id="354" r:id="rId11"/>
   </p:sldIdLst>
   <p:sldSz cx="9144000" cy="6858000" type="screen4x3"/>
   <p:notesSz cx="6858000" cy="9144000"/>
@@ -115,8 +122,15 @@
         <p14:section name="Default Section" id="{F4E0D724-4786-4361-9BBD-3A23742CDCB7}">
           <p14:sldIdLst>
             <p14:sldId id="256"/>
+            <p14:sldId id="355"/>
             <p14:sldId id="257"/>
-            <p14:sldId id="353"/>
+            <p14:sldId id="356"/>
+            <p14:sldId id="361"/>
+            <p14:sldId id="357"/>
+            <p14:sldId id="358"/>
+            <p14:sldId id="359"/>
+            <p14:sldId id="360"/>
+            <p14:sldId id="354"/>
           </p14:sldIdLst>
         </p14:section>
       </p14:sectionLst>
@@ -584,6 +598,99 @@
 </p:notes>
 </file>
 
+<file path=ppt/notesSlides/notesSlide10.xml><?xml version="1.0" encoding="utf-8"?>
+<p:notes xmlns:a="http://schemas.openxmlformats.org/drawingml/2006/main" xmlns:r="http://schemas.openxmlformats.org/officeDocument/2006/relationships" xmlns:p="http://schemas.openxmlformats.org/presentationml/2006/main">
+  <p:cSld>
+    <p:spTree>
+      <p:nvGrpSpPr>
+        <p:cNvPr id="1" name=""/>
+        <p:cNvGrpSpPr/>
+        <p:nvPr/>
+      </p:nvGrpSpPr>
+      <p:grpSpPr>
+        <a:xfrm>
+          <a:off x="0" y="0"/>
+          <a:ext cx="0" cy="0"/>
+          <a:chOff x="0" y="0"/>
+          <a:chExt cx="0" cy="0"/>
+        </a:xfrm>
+      </p:grpSpPr>
+      <p:sp>
+        <p:nvSpPr>
+          <p:cNvPr id="17410" name="Rectangle 7"/>
+          <p:cNvSpPr>
+            <a:spLocks noGrp="1" noChangeArrowheads="1"/>
+          </p:cNvSpPr>
+          <p:nvPr>
+            <p:ph type="sldNum" sz="quarter" idx="5"/>
+          </p:nvPr>
+        </p:nvSpPr>
+        <p:spPr>
+          <a:noFill/>
+        </p:spPr>
+        <p:txBody>
+          <a:bodyPr/>
+          <a:lstStyle/>
+          <a:p>
+            <a:fld id="{8ED0675C-A053-46D5-A6C1-DA2B2F416236}" type="slidenum">
+              <a:rPr lang="en-US" smtClean="0"/>
+              <a:pPr/>
+              <a:t>10</a:t>
+            </a:fld>
+            <a:endParaRPr lang="en-US"/>
+          </a:p>
+        </p:txBody>
+      </p:sp>
+      <p:sp>
+        <p:nvSpPr>
+          <p:cNvPr id="17411" name="Rectangle 2"/>
+          <p:cNvSpPr>
+            <a:spLocks noGrp="1" noRot="1" noChangeAspect="1" noChangeArrowheads="1" noTextEdit="1"/>
+          </p:cNvSpPr>
+          <p:nvPr>
+            <p:ph type="sldImg"/>
+          </p:nvPr>
+        </p:nvSpPr>
+        <p:spPr>
+          <a:ln/>
+        </p:spPr>
+      </p:sp>
+      <p:sp>
+        <p:nvSpPr>
+          <p:cNvPr id="17412" name="Rectangle 3"/>
+          <p:cNvSpPr>
+            <a:spLocks noGrp="1" noChangeArrowheads="1"/>
+          </p:cNvSpPr>
+          <p:nvPr>
+            <p:ph type="body" idx="1"/>
+          </p:nvPr>
+        </p:nvSpPr>
+        <p:spPr>
+          <a:noFill/>
+          <a:ln/>
+        </p:spPr>
+        <p:txBody>
+          <a:bodyPr/>
+          <a:lstStyle/>
+          <a:p>
+            <a:pPr eaLnBrk="1" hangingPunct="1"/>
+            <a:endParaRPr lang="pt-BR"/>
+          </a:p>
+        </p:txBody>
+      </p:sp>
+    </p:spTree>
+    <p:extLst>
+      <p:ext uri="{BB962C8B-B14F-4D97-AF65-F5344CB8AC3E}">
+        <p14:creationId xmlns:p14="http://schemas.microsoft.com/office/powerpoint/2010/main" val="3886505753"/>
+      </p:ext>
+    </p:extLst>
+  </p:cSld>
+  <p:clrMapOvr>
+    <a:masterClrMapping/>
+  </p:clrMapOvr>
+</p:notes>
+</file>
+
 <file path=ppt/notesSlides/notesSlide2.xml><?xml version="1.0" encoding="utf-8"?>
 <p:notes xmlns:a="http://schemas.openxmlformats.org/drawingml/2006/main" xmlns:r="http://schemas.openxmlformats.org/officeDocument/2006/relationships" xmlns:p="http://schemas.openxmlformats.org/presentationml/2006/main">
   <p:cSld>
@@ -664,7 +771,655 @@
     </p:spTree>
     <p:extLst>
       <p:ext uri="{BB962C8B-B14F-4D97-AF65-F5344CB8AC3E}">
+        <p14:creationId xmlns:p14="http://schemas.microsoft.com/office/powerpoint/2010/main" val="2839399641"/>
+      </p:ext>
+    </p:extLst>
+  </p:cSld>
+  <p:clrMapOvr>
+    <a:masterClrMapping/>
+  </p:clrMapOvr>
+</p:notes>
+</file>
+
+<file path=ppt/notesSlides/notesSlide3.xml><?xml version="1.0" encoding="utf-8"?>
+<p:notes xmlns:a="http://schemas.openxmlformats.org/drawingml/2006/main" xmlns:r="http://schemas.openxmlformats.org/officeDocument/2006/relationships" xmlns:p="http://schemas.openxmlformats.org/presentationml/2006/main">
+  <p:cSld>
+    <p:spTree>
+      <p:nvGrpSpPr>
+        <p:cNvPr id="1" name=""/>
+        <p:cNvGrpSpPr/>
+        <p:nvPr/>
+      </p:nvGrpSpPr>
+      <p:grpSpPr>
+        <a:xfrm>
+          <a:off x="0" y="0"/>
+          <a:ext cx="0" cy="0"/>
+          <a:chOff x="0" y="0"/>
+          <a:chExt cx="0" cy="0"/>
+        </a:xfrm>
+      </p:grpSpPr>
+      <p:sp>
+        <p:nvSpPr>
+          <p:cNvPr id="2" name="Slide Image Placeholder 1"/>
+          <p:cNvSpPr>
+            <a:spLocks noGrp="1" noRot="1" noChangeAspect="1"/>
+          </p:cNvSpPr>
+          <p:nvPr>
+            <p:ph type="sldImg"/>
+          </p:nvPr>
+        </p:nvSpPr>
+        <p:spPr/>
+      </p:sp>
+      <p:sp>
+        <p:nvSpPr>
+          <p:cNvPr id="3" name="Notes Placeholder 2"/>
+          <p:cNvSpPr>
+            <a:spLocks noGrp="1"/>
+          </p:cNvSpPr>
+          <p:nvPr>
+            <p:ph type="body" idx="1"/>
+          </p:nvPr>
+        </p:nvSpPr>
+        <p:spPr/>
+        <p:txBody>
+          <a:bodyPr/>
+          <a:lstStyle/>
+          <a:p>
+            <a:endParaRPr lang="en-US"/>
+          </a:p>
+        </p:txBody>
+      </p:sp>
+      <p:sp>
+        <p:nvSpPr>
+          <p:cNvPr id="4" name="Slide Number Placeholder 3"/>
+          <p:cNvSpPr>
+            <a:spLocks noGrp="1"/>
+          </p:cNvSpPr>
+          <p:nvPr>
+            <p:ph type="sldNum" sz="quarter" idx="10"/>
+          </p:nvPr>
+        </p:nvSpPr>
+        <p:spPr/>
+        <p:txBody>
+          <a:bodyPr/>
+          <a:lstStyle/>
+          <a:p>
+            <a:pPr>
+              <a:defRPr/>
+            </a:pPr>
+            <a:fld id="{F1E9DB37-CFDB-4EF6-84D9-B0B64A3FEBC1}" type="slidenum">
+              <a:rPr lang="en-US" smtClean="0"/>
+              <a:pPr>
+                <a:defRPr/>
+              </a:pPr>
+              <a:t>3</a:t>
+            </a:fld>
+            <a:endParaRPr lang="en-US"/>
+          </a:p>
+        </p:txBody>
+      </p:sp>
+    </p:spTree>
+    <p:extLst>
+      <p:ext uri="{BB962C8B-B14F-4D97-AF65-F5344CB8AC3E}">
         <p14:creationId xmlns:p14="http://schemas.microsoft.com/office/powerpoint/2010/main" val="775941277"/>
+      </p:ext>
+    </p:extLst>
+  </p:cSld>
+  <p:clrMapOvr>
+    <a:masterClrMapping/>
+  </p:clrMapOvr>
+</p:notes>
+</file>
+
+<file path=ppt/notesSlides/notesSlide4.xml><?xml version="1.0" encoding="utf-8"?>
+<p:notes xmlns:a="http://schemas.openxmlformats.org/drawingml/2006/main" xmlns:r="http://schemas.openxmlformats.org/officeDocument/2006/relationships" xmlns:p="http://schemas.openxmlformats.org/presentationml/2006/main">
+  <p:cSld>
+    <p:spTree>
+      <p:nvGrpSpPr>
+        <p:cNvPr id="1" name=""/>
+        <p:cNvGrpSpPr/>
+        <p:nvPr/>
+      </p:nvGrpSpPr>
+      <p:grpSpPr>
+        <a:xfrm>
+          <a:off x="0" y="0"/>
+          <a:ext cx="0" cy="0"/>
+          <a:chOff x="0" y="0"/>
+          <a:chExt cx="0" cy="0"/>
+        </a:xfrm>
+      </p:grpSpPr>
+      <p:sp>
+        <p:nvSpPr>
+          <p:cNvPr id="2" name="Slide Image Placeholder 1"/>
+          <p:cNvSpPr>
+            <a:spLocks noGrp="1" noRot="1" noChangeAspect="1"/>
+          </p:cNvSpPr>
+          <p:nvPr>
+            <p:ph type="sldImg"/>
+          </p:nvPr>
+        </p:nvSpPr>
+        <p:spPr/>
+      </p:sp>
+      <p:sp>
+        <p:nvSpPr>
+          <p:cNvPr id="3" name="Notes Placeholder 2"/>
+          <p:cNvSpPr>
+            <a:spLocks noGrp="1"/>
+          </p:cNvSpPr>
+          <p:nvPr>
+            <p:ph type="body" idx="1"/>
+          </p:nvPr>
+        </p:nvSpPr>
+        <p:spPr/>
+        <p:txBody>
+          <a:bodyPr/>
+          <a:lstStyle/>
+          <a:p>
+            <a:pPr lvl="1">
+              <a:buFont typeface="Arial" panose="020B0604020202020204" pitchFamily="34" charset="0"/>
+              <a:buNone/>
+            </a:pPr>
+            <a:r>
+              <a:rPr lang="en-US" dirty="0" err="1"/>
+              <a:t>Dificuldades</a:t>
+            </a:r>
+            <a:r>
+              <a:rPr lang="en-US" dirty="0"/>
+              <a:t>: </a:t>
+            </a:r>
+            <a:r>
+              <a:rPr lang="pt-BR" dirty="0"/>
+              <a:t>tarefas complexas e a experiência dos envolvidos está diretamente ligada ao resultado;</a:t>
+            </a:r>
+          </a:p>
+          <a:p>
+            <a:endParaRPr lang="en-US" dirty="0"/>
+          </a:p>
+        </p:txBody>
+      </p:sp>
+      <p:sp>
+        <p:nvSpPr>
+          <p:cNvPr id="4" name="Slide Number Placeholder 3"/>
+          <p:cNvSpPr>
+            <a:spLocks noGrp="1"/>
+          </p:cNvSpPr>
+          <p:nvPr>
+            <p:ph type="sldNum" sz="quarter" idx="10"/>
+          </p:nvPr>
+        </p:nvSpPr>
+        <p:spPr/>
+        <p:txBody>
+          <a:bodyPr/>
+          <a:lstStyle/>
+          <a:p>
+            <a:pPr>
+              <a:defRPr/>
+            </a:pPr>
+            <a:fld id="{F1E9DB37-CFDB-4EF6-84D9-B0B64A3FEBC1}" type="slidenum">
+              <a:rPr lang="en-US" smtClean="0"/>
+              <a:pPr>
+                <a:defRPr/>
+              </a:pPr>
+              <a:t>4</a:t>
+            </a:fld>
+            <a:endParaRPr lang="en-US"/>
+          </a:p>
+        </p:txBody>
+      </p:sp>
+    </p:spTree>
+    <p:extLst>
+      <p:ext uri="{BB962C8B-B14F-4D97-AF65-F5344CB8AC3E}">
+        <p14:creationId xmlns:p14="http://schemas.microsoft.com/office/powerpoint/2010/main" val="2209506414"/>
+      </p:ext>
+    </p:extLst>
+  </p:cSld>
+  <p:clrMapOvr>
+    <a:masterClrMapping/>
+  </p:clrMapOvr>
+</p:notes>
+</file>
+
+<file path=ppt/notesSlides/notesSlide5.xml><?xml version="1.0" encoding="utf-8"?>
+<p:notes xmlns:a="http://schemas.openxmlformats.org/drawingml/2006/main" xmlns:r="http://schemas.openxmlformats.org/officeDocument/2006/relationships" xmlns:p="http://schemas.openxmlformats.org/presentationml/2006/main">
+  <p:cSld>
+    <p:spTree>
+      <p:nvGrpSpPr>
+        <p:cNvPr id="1" name=""/>
+        <p:cNvGrpSpPr/>
+        <p:nvPr/>
+      </p:nvGrpSpPr>
+      <p:grpSpPr>
+        <a:xfrm>
+          <a:off x="0" y="0"/>
+          <a:ext cx="0" cy="0"/>
+          <a:chOff x="0" y="0"/>
+          <a:chExt cx="0" cy="0"/>
+        </a:xfrm>
+      </p:grpSpPr>
+      <p:sp>
+        <p:nvSpPr>
+          <p:cNvPr id="2" name="Slide Image Placeholder 1"/>
+          <p:cNvSpPr>
+            <a:spLocks noGrp="1" noRot="1" noChangeAspect="1"/>
+          </p:cNvSpPr>
+          <p:nvPr>
+            <p:ph type="sldImg"/>
+          </p:nvPr>
+        </p:nvSpPr>
+        <p:spPr/>
+      </p:sp>
+      <p:sp>
+        <p:nvSpPr>
+          <p:cNvPr id="3" name="Notes Placeholder 2"/>
+          <p:cNvSpPr>
+            <a:spLocks noGrp="1"/>
+          </p:cNvSpPr>
+          <p:nvPr>
+            <p:ph type="body" idx="1"/>
+          </p:nvPr>
+        </p:nvSpPr>
+        <p:spPr/>
+        <p:txBody>
+          <a:bodyPr/>
+          <a:lstStyle/>
+          <a:p>
+            <a:endParaRPr lang="en-US"/>
+          </a:p>
+        </p:txBody>
+      </p:sp>
+      <p:sp>
+        <p:nvSpPr>
+          <p:cNvPr id="4" name="Slide Number Placeholder 3"/>
+          <p:cNvSpPr>
+            <a:spLocks noGrp="1"/>
+          </p:cNvSpPr>
+          <p:nvPr>
+            <p:ph type="sldNum" sz="quarter" idx="10"/>
+          </p:nvPr>
+        </p:nvSpPr>
+        <p:spPr/>
+        <p:txBody>
+          <a:bodyPr/>
+          <a:lstStyle/>
+          <a:p>
+            <a:pPr>
+              <a:defRPr/>
+            </a:pPr>
+            <a:fld id="{F1E9DB37-CFDB-4EF6-84D9-B0B64A3FEBC1}" type="slidenum">
+              <a:rPr lang="en-US" smtClean="0"/>
+              <a:pPr>
+                <a:defRPr/>
+              </a:pPr>
+              <a:t>5</a:t>
+            </a:fld>
+            <a:endParaRPr lang="en-US"/>
+          </a:p>
+        </p:txBody>
+      </p:sp>
+    </p:spTree>
+    <p:extLst>
+      <p:ext uri="{BB962C8B-B14F-4D97-AF65-F5344CB8AC3E}">
+        <p14:creationId xmlns:p14="http://schemas.microsoft.com/office/powerpoint/2010/main" val="2206453710"/>
+      </p:ext>
+    </p:extLst>
+  </p:cSld>
+  <p:clrMapOvr>
+    <a:masterClrMapping/>
+  </p:clrMapOvr>
+</p:notes>
+</file>
+
+<file path=ppt/notesSlides/notesSlide6.xml><?xml version="1.0" encoding="utf-8"?>
+<p:notes xmlns:a="http://schemas.openxmlformats.org/drawingml/2006/main" xmlns:r="http://schemas.openxmlformats.org/officeDocument/2006/relationships" xmlns:p="http://schemas.openxmlformats.org/presentationml/2006/main">
+  <p:cSld>
+    <p:spTree>
+      <p:nvGrpSpPr>
+        <p:cNvPr id="1" name=""/>
+        <p:cNvGrpSpPr/>
+        <p:nvPr/>
+      </p:nvGrpSpPr>
+      <p:grpSpPr>
+        <a:xfrm>
+          <a:off x="0" y="0"/>
+          <a:ext cx="0" cy="0"/>
+          <a:chOff x="0" y="0"/>
+          <a:chExt cx="0" cy="0"/>
+        </a:xfrm>
+      </p:grpSpPr>
+      <p:sp>
+        <p:nvSpPr>
+          <p:cNvPr id="2" name="Slide Image Placeholder 1"/>
+          <p:cNvSpPr>
+            <a:spLocks noGrp="1" noRot="1" noChangeAspect="1"/>
+          </p:cNvSpPr>
+          <p:nvPr>
+            <p:ph type="sldImg"/>
+          </p:nvPr>
+        </p:nvSpPr>
+        <p:spPr/>
+      </p:sp>
+      <p:sp>
+        <p:nvSpPr>
+          <p:cNvPr id="3" name="Notes Placeholder 2"/>
+          <p:cNvSpPr>
+            <a:spLocks noGrp="1"/>
+          </p:cNvSpPr>
+          <p:nvPr>
+            <p:ph type="body" idx="1"/>
+          </p:nvPr>
+        </p:nvSpPr>
+        <p:spPr/>
+        <p:txBody>
+          <a:bodyPr/>
+          <a:lstStyle/>
+          <a:p>
+            <a:endParaRPr lang="en-US"/>
+          </a:p>
+        </p:txBody>
+      </p:sp>
+      <p:sp>
+        <p:nvSpPr>
+          <p:cNvPr id="4" name="Slide Number Placeholder 3"/>
+          <p:cNvSpPr>
+            <a:spLocks noGrp="1"/>
+          </p:cNvSpPr>
+          <p:nvPr>
+            <p:ph type="sldNum" sz="quarter" idx="10"/>
+          </p:nvPr>
+        </p:nvSpPr>
+        <p:spPr/>
+        <p:txBody>
+          <a:bodyPr/>
+          <a:lstStyle/>
+          <a:p>
+            <a:pPr>
+              <a:defRPr/>
+            </a:pPr>
+            <a:fld id="{F1E9DB37-CFDB-4EF6-84D9-B0B64A3FEBC1}" type="slidenum">
+              <a:rPr lang="en-US" smtClean="0"/>
+              <a:pPr>
+                <a:defRPr/>
+              </a:pPr>
+              <a:t>6</a:t>
+            </a:fld>
+            <a:endParaRPr lang="en-US"/>
+          </a:p>
+        </p:txBody>
+      </p:sp>
+    </p:spTree>
+    <p:extLst>
+      <p:ext uri="{BB962C8B-B14F-4D97-AF65-F5344CB8AC3E}">
+        <p14:creationId xmlns:p14="http://schemas.microsoft.com/office/powerpoint/2010/main" val="4172282562"/>
+      </p:ext>
+    </p:extLst>
+  </p:cSld>
+  <p:clrMapOvr>
+    <a:masterClrMapping/>
+  </p:clrMapOvr>
+</p:notes>
+</file>
+
+<file path=ppt/notesSlides/notesSlide7.xml><?xml version="1.0" encoding="utf-8"?>
+<p:notes xmlns:a="http://schemas.openxmlformats.org/drawingml/2006/main" xmlns:r="http://schemas.openxmlformats.org/officeDocument/2006/relationships" xmlns:p="http://schemas.openxmlformats.org/presentationml/2006/main">
+  <p:cSld>
+    <p:spTree>
+      <p:nvGrpSpPr>
+        <p:cNvPr id="1" name=""/>
+        <p:cNvGrpSpPr/>
+        <p:nvPr/>
+      </p:nvGrpSpPr>
+      <p:grpSpPr>
+        <a:xfrm>
+          <a:off x="0" y="0"/>
+          <a:ext cx="0" cy="0"/>
+          <a:chOff x="0" y="0"/>
+          <a:chExt cx="0" cy="0"/>
+        </a:xfrm>
+      </p:grpSpPr>
+      <p:sp>
+        <p:nvSpPr>
+          <p:cNvPr id="2" name="Slide Image Placeholder 1"/>
+          <p:cNvSpPr>
+            <a:spLocks noGrp="1" noRot="1" noChangeAspect="1"/>
+          </p:cNvSpPr>
+          <p:nvPr>
+            <p:ph type="sldImg"/>
+          </p:nvPr>
+        </p:nvSpPr>
+        <p:spPr/>
+      </p:sp>
+      <p:sp>
+        <p:nvSpPr>
+          <p:cNvPr id="3" name="Notes Placeholder 2"/>
+          <p:cNvSpPr>
+            <a:spLocks noGrp="1"/>
+          </p:cNvSpPr>
+          <p:nvPr>
+            <p:ph type="body" idx="1"/>
+          </p:nvPr>
+        </p:nvSpPr>
+        <p:spPr/>
+        <p:txBody>
+          <a:bodyPr/>
+          <a:lstStyle/>
+          <a:p>
+            <a:endParaRPr lang="en-US"/>
+          </a:p>
+        </p:txBody>
+      </p:sp>
+      <p:sp>
+        <p:nvSpPr>
+          <p:cNvPr id="4" name="Slide Number Placeholder 3"/>
+          <p:cNvSpPr>
+            <a:spLocks noGrp="1"/>
+          </p:cNvSpPr>
+          <p:nvPr>
+            <p:ph type="sldNum" sz="quarter" idx="10"/>
+          </p:nvPr>
+        </p:nvSpPr>
+        <p:spPr/>
+        <p:txBody>
+          <a:bodyPr/>
+          <a:lstStyle/>
+          <a:p>
+            <a:pPr>
+              <a:defRPr/>
+            </a:pPr>
+            <a:fld id="{F1E9DB37-CFDB-4EF6-84D9-B0B64A3FEBC1}" type="slidenum">
+              <a:rPr lang="en-US" smtClean="0"/>
+              <a:pPr>
+                <a:defRPr/>
+              </a:pPr>
+              <a:t>7</a:t>
+            </a:fld>
+            <a:endParaRPr lang="en-US"/>
+          </a:p>
+        </p:txBody>
+      </p:sp>
+    </p:spTree>
+    <p:extLst>
+      <p:ext uri="{BB962C8B-B14F-4D97-AF65-F5344CB8AC3E}">
+        <p14:creationId xmlns:p14="http://schemas.microsoft.com/office/powerpoint/2010/main" val="2549412756"/>
+      </p:ext>
+    </p:extLst>
+  </p:cSld>
+  <p:clrMapOvr>
+    <a:masterClrMapping/>
+  </p:clrMapOvr>
+</p:notes>
+</file>
+
+<file path=ppt/notesSlides/notesSlide8.xml><?xml version="1.0" encoding="utf-8"?>
+<p:notes xmlns:a="http://schemas.openxmlformats.org/drawingml/2006/main" xmlns:r="http://schemas.openxmlformats.org/officeDocument/2006/relationships" xmlns:p="http://schemas.openxmlformats.org/presentationml/2006/main">
+  <p:cSld>
+    <p:spTree>
+      <p:nvGrpSpPr>
+        <p:cNvPr id="1" name=""/>
+        <p:cNvGrpSpPr/>
+        <p:nvPr/>
+      </p:nvGrpSpPr>
+      <p:grpSpPr>
+        <a:xfrm>
+          <a:off x="0" y="0"/>
+          <a:ext cx="0" cy="0"/>
+          <a:chOff x="0" y="0"/>
+          <a:chExt cx="0" cy="0"/>
+        </a:xfrm>
+      </p:grpSpPr>
+      <p:sp>
+        <p:nvSpPr>
+          <p:cNvPr id="2" name="Slide Image Placeholder 1"/>
+          <p:cNvSpPr>
+            <a:spLocks noGrp="1" noRot="1" noChangeAspect="1"/>
+          </p:cNvSpPr>
+          <p:nvPr>
+            <p:ph type="sldImg"/>
+          </p:nvPr>
+        </p:nvSpPr>
+        <p:spPr/>
+      </p:sp>
+      <p:sp>
+        <p:nvSpPr>
+          <p:cNvPr id="3" name="Notes Placeholder 2"/>
+          <p:cNvSpPr>
+            <a:spLocks noGrp="1"/>
+          </p:cNvSpPr>
+          <p:nvPr>
+            <p:ph type="body" idx="1"/>
+          </p:nvPr>
+        </p:nvSpPr>
+        <p:spPr/>
+        <p:txBody>
+          <a:bodyPr/>
+          <a:lstStyle/>
+          <a:p>
+            <a:endParaRPr lang="en-US"/>
+          </a:p>
+        </p:txBody>
+      </p:sp>
+      <p:sp>
+        <p:nvSpPr>
+          <p:cNvPr id="4" name="Slide Number Placeholder 3"/>
+          <p:cNvSpPr>
+            <a:spLocks noGrp="1"/>
+          </p:cNvSpPr>
+          <p:nvPr>
+            <p:ph type="sldNum" sz="quarter" idx="10"/>
+          </p:nvPr>
+        </p:nvSpPr>
+        <p:spPr/>
+        <p:txBody>
+          <a:bodyPr/>
+          <a:lstStyle/>
+          <a:p>
+            <a:pPr>
+              <a:defRPr/>
+            </a:pPr>
+            <a:fld id="{F1E9DB37-CFDB-4EF6-84D9-B0B64A3FEBC1}" type="slidenum">
+              <a:rPr lang="en-US" smtClean="0"/>
+              <a:pPr>
+                <a:defRPr/>
+              </a:pPr>
+              <a:t>8</a:t>
+            </a:fld>
+            <a:endParaRPr lang="en-US"/>
+          </a:p>
+        </p:txBody>
+      </p:sp>
+    </p:spTree>
+    <p:extLst>
+      <p:ext uri="{BB962C8B-B14F-4D97-AF65-F5344CB8AC3E}">
+        <p14:creationId xmlns:p14="http://schemas.microsoft.com/office/powerpoint/2010/main" val="4223038415"/>
+      </p:ext>
+    </p:extLst>
+  </p:cSld>
+  <p:clrMapOvr>
+    <a:masterClrMapping/>
+  </p:clrMapOvr>
+</p:notes>
+</file>
+
+<file path=ppt/notesSlides/notesSlide9.xml><?xml version="1.0" encoding="utf-8"?>
+<p:notes xmlns:a="http://schemas.openxmlformats.org/drawingml/2006/main" xmlns:r="http://schemas.openxmlformats.org/officeDocument/2006/relationships" xmlns:p="http://schemas.openxmlformats.org/presentationml/2006/main">
+  <p:cSld>
+    <p:spTree>
+      <p:nvGrpSpPr>
+        <p:cNvPr id="1" name=""/>
+        <p:cNvGrpSpPr/>
+        <p:nvPr/>
+      </p:nvGrpSpPr>
+      <p:grpSpPr>
+        <a:xfrm>
+          <a:off x="0" y="0"/>
+          <a:ext cx="0" cy="0"/>
+          <a:chOff x="0" y="0"/>
+          <a:chExt cx="0" cy="0"/>
+        </a:xfrm>
+      </p:grpSpPr>
+      <p:sp>
+        <p:nvSpPr>
+          <p:cNvPr id="2" name="Slide Image Placeholder 1"/>
+          <p:cNvSpPr>
+            <a:spLocks noGrp="1" noRot="1" noChangeAspect="1"/>
+          </p:cNvSpPr>
+          <p:nvPr>
+            <p:ph type="sldImg"/>
+          </p:nvPr>
+        </p:nvSpPr>
+        <p:spPr/>
+      </p:sp>
+      <p:sp>
+        <p:nvSpPr>
+          <p:cNvPr id="3" name="Notes Placeholder 2"/>
+          <p:cNvSpPr>
+            <a:spLocks noGrp="1"/>
+          </p:cNvSpPr>
+          <p:nvPr>
+            <p:ph type="body" idx="1"/>
+          </p:nvPr>
+        </p:nvSpPr>
+        <p:spPr/>
+        <p:txBody>
+          <a:bodyPr/>
+          <a:lstStyle/>
+          <a:p>
+            <a:endParaRPr lang="en-US"/>
+          </a:p>
+        </p:txBody>
+      </p:sp>
+      <p:sp>
+        <p:nvSpPr>
+          <p:cNvPr id="4" name="Slide Number Placeholder 3"/>
+          <p:cNvSpPr>
+            <a:spLocks noGrp="1"/>
+          </p:cNvSpPr>
+          <p:nvPr>
+            <p:ph type="sldNum" sz="quarter" idx="10"/>
+          </p:nvPr>
+        </p:nvSpPr>
+        <p:spPr/>
+        <p:txBody>
+          <a:bodyPr/>
+          <a:lstStyle/>
+          <a:p>
+            <a:pPr>
+              <a:defRPr/>
+            </a:pPr>
+            <a:fld id="{F1E9DB37-CFDB-4EF6-84D9-B0B64A3FEBC1}" type="slidenum">
+              <a:rPr lang="en-US" smtClean="0"/>
+              <a:pPr>
+                <a:defRPr/>
+              </a:pPr>
+              <a:t>9</a:t>
+            </a:fld>
+            <a:endParaRPr lang="en-US"/>
+          </a:p>
+        </p:txBody>
+      </p:sp>
+    </p:spTree>
+    <p:extLst>
+      <p:ext uri="{BB962C8B-B14F-4D97-AF65-F5344CB8AC3E}">
+        <p14:creationId xmlns:p14="http://schemas.microsoft.com/office/powerpoint/2010/main" val="848067076"/>
       </p:ext>
     </p:extLst>
   </p:cSld>
@@ -3549,7 +4304,7 @@
               <a:pPr/>
               <a:t>‹nº›</a:t>
             </a:fld>
-            <a:endParaRPr lang="pt-BR"/>
+            <a:endParaRPr lang="pt-BR" dirty="0"/>
           </a:p>
         </p:txBody>
       </p:sp>
@@ -6131,7 +6886,7 @@
 </p:sld>
 </file>
 
-<file path=ppt/slides/slide2.xml><?xml version="1.0" encoding="utf-8"?>
+<file path=ppt/slides/slide10.xml><?xml version="1.0" encoding="utf-8"?>
 <p:sld xmlns:a="http://schemas.openxmlformats.org/drawingml/2006/main" xmlns:r="http://schemas.openxmlformats.org/officeDocument/2006/relationships" xmlns:p="http://schemas.openxmlformats.org/presentationml/2006/main">
   <p:cSld>
     <p:spTree>
@@ -6150,6 +6905,152 @@
       </p:grpSpPr>
       <p:sp>
         <p:nvSpPr>
+          <p:cNvPr id="3" name="Text Placeholder 2"/>
+          <p:cNvSpPr>
+            <a:spLocks noGrp="1"/>
+          </p:cNvSpPr>
+          <p:nvPr>
+            <p:ph type="body" sz="quarter" idx="15"/>
+          </p:nvPr>
+        </p:nvSpPr>
+        <p:spPr>
+          <a:xfrm>
+            <a:off x="1187624" y="4869160"/>
+            <a:ext cx="7344816" cy="1343706"/>
+          </a:xfrm>
+        </p:spPr>
+        <p:txBody>
+          <a:bodyPr>
+            <a:normAutofit fontScale="25000" lnSpcReduction="20000"/>
+          </a:bodyPr>
+          <a:lstStyle/>
+          <a:p>
+            <a:r>
+              <a:rPr lang="pt-BR" sz="11200" dirty="0"/>
+              <a:t>Lincoln M. Costa</a:t>
+            </a:r>
+          </a:p>
+          <a:p>
+            <a:r>
+              <a:rPr lang="pt-BR" sz="6400" dirty="0"/>
+              <a:t>PESC/COPPE</a:t>
+            </a:r>
+          </a:p>
+          <a:p>
+            <a:r>
+              <a:rPr lang="pt-BR" sz="6400" dirty="0"/>
+              <a:t>Universidade Federal do Rio de Janeiro</a:t>
+            </a:r>
+          </a:p>
+          <a:p>
+            <a:r>
+              <a:rPr lang="pt-BR" dirty="0">
+                <a:hlinkClick r:id="rId3"/>
+              </a:rPr>
+              <a:t>costa@cos.ufrj.br</a:t>
+            </a:r>
+            <a:endParaRPr lang="pt-BR" dirty="0"/>
+          </a:p>
+          <a:p>
+            <a:r>
+              <a:rPr lang="pt-BR" dirty="0">
+                <a:hlinkClick r:id="rId4"/>
+              </a:rPr>
+              <a:t>http://ludes.cos.ufrj.br</a:t>
+            </a:r>
+            <a:endParaRPr lang="pt-BR" dirty="0"/>
+          </a:p>
+          <a:p>
+            <a:r>
+              <a:rPr lang="pt-BR" dirty="0">
+                <a:hlinkClick r:id="rId5" action="ppaction://hlinkfile"/>
+              </a:rPr>
+              <a:t>tekpixo.github.io</a:t>
+            </a:r>
+            <a:r>
+              <a:rPr lang="pt-BR" dirty="0"/>
+              <a:t> </a:t>
+            </a:r>
+          </a:p>
+        </p:txBody>
+      </p:sp>
+      <p:sp>
+        <p:nvSpPr>
+          <p:cNvPr id="5" name="Title 4"/>
+          <p:cNvSpPr>
+            <a:spLocks noGrp="1"/>
+          </p:cNvSpPr>
+          <p:nvPr>
+            <p:ph type="title"/>
+          </p:nvPr>
+        </p:nvSpPr>
+        <p:spPr>
+          <a:xfrm>
+            <a:off x="0" y="3140968"/>
+            <a:ext cx="9144000" cy="1118587"/>
+          </a:xfrm>
+        </p:spPr>
+        <p:txBody>
+          <a:bodyPr>
+            <a:noAutofit/>
+          </a:bodyPr>
+          <a:lstStyle/>
+          <a:p>
+            <a:pPr algn="ctr"/>
+            <a:r>
+              <a:rPr lang="pt-BR" sz="3600" dirty="0"/>
+              <a:t>Obrigado pela atenção!</a:t>
+            </a:r>
+            <a:endParaRPr lang="pt-BR" sz="3200" dirty="0"/>
+          </a:p>
+        </p:txBody>
+      </p:sp>
+    </p:spTree>
+    <p:extLst>
+      <p:ext uri="{BB962C8B-B14F-4D97-AF65-F5344CB8AC3E}">
+        <p14:creationId xmlns:p14="http://schemas.microsoft.com/office/powerpoint/2010/main" val="1332669725"/>
+      </p:ext>
+    </p:extLst>
+  </p:cSld>
+  <p:clrMapOvr>
+    <a:masterClrMapping/>
+  </p:clrMapOvr>
+</p:sld>
+</file>
+
+<file path=ppt/slides/slide2.xml><?xml version="1.0" encoding="utf-8"?>
+<p:sld xmlns:a="http://schemas.openxmlformats.org/drawingml/2006/main" xmlns:r="http://schemas.openxmlformats.org/officeDocument/2006/relationships" xmlns:p="http://schemas.openxmlformats.org/presentationml/2006/main">
+  <p:cSld>
+    <p:bg>
+      <p:bgPr>
+        <a:blipFill dpi="0" rotWithShape="1">
+          <a:blip r:embed="rId3">
+            <a:lum/>
+          </a:blip>
+          <a:srcRect/>
+          <a:stretch>
+            <a:fillRect/>
+          </a:stretch>
+        </a:blipFill>
+        <a:effectLst/>
+      </p:bgPr>
+    </p:bg>
+    <p:spTree>
+      <p:nvGrpSpPr>
+        <p:cNvPr id="1" name=""/>
+        <p:cNvGrpSpPr/>
+        <p:nvPr/>
+      </p:nvGrpSpPr>
+      <p:grpSpPr>
+        <a:xfrm>
+          <a:off x="0" y="0"/>
+          <a:ext cx="0" cy="0"/>
+          <a:chOff x="0" y="0"/>
+          <a:chExt cx="0" cy="0"/>
+        </a:xfrm>
+      </p:grpSpPr>
+      <p:sp>
+        <p:nvSpPr>
           <p:cNvPr id="17" name="Date Placeholder 16"/>
           <p:cNvSpPr>
             <a:spLocks noGrp="1"/>
@@ -6164,7 +7065,7 @@
           <a:lstStyle/>
           <a:p>
             <a:r>
-              <a:rPr lang="en-US"/>
+              <a:rPr lang="en-US" dirty="0"/>
               <a:t>LUDES</a:t>
             </a:r>
             <a:endParaRPr lang="pt-BR" dirty="0"/>
@@ -6252,7 +7153,7 @@
           <p:nvPr/>
         </p:nvPicPr>
         <p:blipFill rotWithShape="1">
-          <a:blip r:embed="rId3">
+          <a:blip r:embed="rId4">
             <a:alphaModFix/>
           </a:blip>
           <a:srcRect/>
@@ -6340,21 +7241,14 @@
           </a:bodyPr>
           <a:lstStyle/>
           <a:p>
+            <a:pPr algn="just"/>
             <a:r>
               <a:rPr lang="pt-BR" sz="2000" b="1" dirty="0"/>
               <a:t>Meu nome é Lincoln </a:t>
             </a:r>
             <a:r>
               <a:rPr lang="pt-BR" sz="2000" dirty="0"/>
-              <a:t>e eu trabalho com desenvolvimento de software há cerca de 7 anos. Sou Engenheiro de Software pela UTFPR e Mestrando na área de Engenharia de Dados e Conhecimento pelo PESC da UFRJ. Também sou membro do LUDES, Laboratório de </a:t>
-            </a:r>
-            <a:r>
-              <a:rPr lang="pt-BR" sz="2000" dirty="0" err="1"/>
-              <a:t>Ludologia</a:t>
-            </a:r>
-            <a:r>
-              <a:rPr lang="pt-BR" sz="2000" dirty="0"/>
-              <a:t>, Engenharia e Simulação.</a:t>
+              <a:t>e eu trabalho com desenvolvimento de software há cerca de 7 anos. Sou Engenheiro de Software pela UTFPR e Mestrando na área de Engenharia de Dados e Conhecimento pelo PESC da UFRJ. Também sou membro do LUDES, Laboratório de Ludologia, Engenharia e Simulação.</a:t>
             </a:r>
           </a:p>
           <a:p>
@@ -6391,7 +7285,7 @@
           <p:nvPr/>
         </p:nvPicPr>
         <p:blipFill>
-          <a:blip r:embed="rId4" cstate="print">
+          <a:blip r:embed="rId5" cstate="print">
             <a:extLst>
               <a:ext uri="{28A0092B-C50C-407E-A947-70E740481C1C}">
                 <a14:useLocalDpi xmlns:a14="http://schemas.microsoft.com/office/drawing/2010/main" val="0"/>
@@ -6430,7 +7324,7 @@
           <p:nvPr/>
         </p:nvPicPr>
         <p:blipFill>
-          <a:blip r:embed="rId5" cstate="print">
+          <a:blip r:embed="rId6" cstate="print">
             <a:clrChange>
               <a:clrFrom>
                 <a:srgbClr val="FFFFFF"/>
@@ -6476,7 +7370,7 @@
           <p:nvPr/>
         </p:nvPicPr>
         <p:blipFill rotWithShape="1">
-          <a:blip r:embed="rId6" cstate="print">
+          <a:blip r:embed="rId7" cstate="print">
             <a:extLst>
               <a:ext uri="{28A0092B-C50C-407E-A947-70E740481C1C}">
                 <a14:useLocalDpi xmlns:a14="http://schemas.microsoft.com/office/drawing/2010/main" val="0"/>
@@ -6499,6 +7393,259 @@
     </p:spTree>
     <p:extLst>
       <p:ext uri="{BB962C8B-B14F-4D97-AF65-F5344CB8AC3E}">
+        <p14:creationId xmlns:p14="http://schemas.microsoft.com/office/powerpoint/2010/main" val="593893165"/>
+      </p:ext>
+    </p:extLst>
+  </p:cSld>
+  <p:clrMapOvr>
+    <a:masterClrMapping/>
+  </p:clrMapOvr>
+</p:sld>
+</file>
+
+<file path=ppt/slides/slide3.xml><?xml version="1.0" encoding="utf-8"?>
+<p:sld xmlns:a="http://schemas.openxmlformats.org/drawingml/2006/main" xmlns:r="http://schemas.openxmlformats.org/officeDocument/2006/relationships" xmlns:p="http://schemas.openxmlformats.org/presentationml/2006/main">
+  <p:cSld>
+    <p:bg>
+      <p:bgPr>
+        <a:blipFill dpi="0" rotWithShape="1">
+          <a:blip r:embed="rId3">
+            <a:lum/>
+          </a:blip>
+          <a:srcRect/>
+          <a:stretch>
+            <a:fillRect/>
+          </a:stretch>
+        </a:blipFill>
+        <a:effectLst/>
+      </p:bgPr>
+    </p:bg>
+    <p:spTree>
+      <p:nvGrpSpPr>
+        <p:cNvPr id="1" name=""/>
+        <p:cNvGrpSpPr/>
+        <p:nvPr/>
+      </p:nvGrpSpPr>
+      <p:grpSpPr>
+        <a:xfrm>
+          <a:off x="0" y="0"/>
+          <a:ext cx="0" cy="0"/>
+          <a:chOff x="0" y="0"/>
+          <a:chExt cx="0" cy="0"/>
+        </a:xfrm>
+      </p:grpSpPr>
+      <p:sp>
+        <p:nvSpPr>
+          <p:cNvPr id="2" name="Title 1"/>
+          <p:cNvSpPr>
+            <a:spLocks noGrp="1"/>
+          </p:cNvSpPr>
+          <p:nvPr>
+            <p:ph type="title"/>
+          </p:nvPr>
+        </p:nvSpPr>
+        <p:spPr/>
+        <p:txBody>
+          <a:bodyPr/>
+          <a:lstStyle/>
+          <a:p>
+            <a:r>
+              <a:rPr lang="pt-BR" dirty="0"/>
+              <a:t>Agenda</a:t>
+            </a:r>
+          </a:p>
+        </p:txBody>
+      </p:sp>
+      <p:sp>
+        <p:nvSpPr>
+          <p:cNvPr id="17" name="Date Placeholder 16"/>
+          <p:cNvSpPr>
+            <a:spLocks noGrp="1"/>
+          </p:cNvSpPr>
+          <p:nvPr>
+            <p:ph type="dt" sz="half" idx="10"/>
+          </p:nvPr>
+        </p:nvSpPr>
+        <p:spPr/>
+        <p:txBody>
+          <a:bodyPr/>
+          <a:lstStyle/>
+          <a:p>
+            <a:r>
+              <a:rPr lang="en-US" dirty="0"/>
+              <a:t>LUDES</a:t>
+            </a:r>
+            <a:endParaRPr lang="pt-BR" dirty="0"/>
+          </a:p>
+        </p:txBody>
+      </p:sp>
+      <p:sp>
+        <p:nvSpPr>
+          <p:cNvPr id="18" name="Footer Placeholder 17"/>
+          <p:cNvSpPr>
+            <a:spLocks noGrp="1"/>
+          </p:cNvSpPr>
+          <p:nvPr>
+            <p:ph type="ftr" sz="quarter" idx="11"/>
+          </p:nvPr>
+        </p:nvSpPr>
+        <p:spPr/>
+        <p:txBody>
+          <a:bodyPr/>
+          <a:lstStyle/>
+          <a:p>
+            <a:r>
+              <a:rPr lang="pt-BR" dirty="0"/>
+              <a:t>Lincoln Costa / costa@cos.ufrj.br</a:t>
+            </a:r>
+          </a:p>
+        </p:txBody>
+      </p:sp>
+      <p:sp>
+        <p:nvSpPr>
+          <p:cNvPr id="20" name="Slide Number Placeholder 19"/>
+          <p:cNvSpPr>
+            <a:spLocks noGrp="1"/>
+          </p:cNvSpPr>
+          <p:nvPr>
+            <p:ph type="sldNum" sz="quarter" idx="12"/>
+          </p:nvPr>
+        </p:nvSpPr>
+        <p:spPr/>
+        <p:txBody>
+          <a:bodyPr/>
+          <a:lstStyle/>
+          <a:p>
+            <a:fld id="{BB152AAB-E794-4AAE-96FF-3CDB8C5C9FC8}" type="slidenum">
+              <a:rPr lang="pt-BR" smtClean="0"/>
+              <a:pPr/>
+              <a:t>3</a:t>
+            </a:fld>
+            <a:endParaRPr lang="pt-BR" dirty="0"/>
+          </a:p>
+        </p:txBody>
+      </p:sp>
+      <p:sp>
+        <p:nvSpPr>
+          <p:cNvPr id="7" name="Espaço Reservado para Conteúdo 6">
+            <a:extLst>
+              <a:ext uri="{FF2B5EF4-FFF2-40B4-BE49-F238E27FC236}">
+                <a16:creationId xmlns:a16="http://schemas.microsoft.com/office/drawing/2014/main" id="{970ABBE5-C615-480E-84AC-B73FB7BF52AD}"/>
+              </a:ext>
+            </a:extLst>
+          </p:cNvPr>
+          <p:cNvSpPr>
+            <a:spLocks noGrp="1"/>
+          </p:cNvSpPr>
+          <p:nvPr>
+            <p:ph sz="quarter" idx="13"/>
+          </p:nvPr>
+        </p:nvSpPr>
+        <p:spPr/>
+        <p:txBody>
+          <a:bodyPr/>
+          <a:lstStyle/>
+          <a:p>
+            <a:pPr algn="just">
+              <a:buFont typeface="Wingdings" panose="05000000000000000000" pitchFamily="2" charset="2"/>
+              <a:buChar char="Ø"/>
+            </a:pPr>
+            <a:r>
+              <a:rPr lang="pt-BR" dirty="0">
+                <a:latin typeface="+mn-lt"/>
+              </a:rPr>
+              <a:t> Introdução</a:t>
+            </a:r>
+          </a:p>
+          <a:p>
+            <a:pPr algn="just">
+              <a:buFont typeface="Wingdings" panose="05000000000000000000" pitchFamily="2" charset="2"/>
+              <a:buChar char="Ø"/>
+            </a:pPr>
+            <a:r>
+              <a:rPr lang="pt-BR" dirty="0">
+                <a:latin typeface="+mn-lt"/>
+              </a:rPr>
+              <a:t> O que são variantes?</a:t>
+            </a:r>
+          </a:p>
+          <a:p>
+            <a:pPr algn="just">
+              <a:buFont typeface="Wingdings" panose="05000000000000000000" pitchFamily="2" charset="2"/>
+              <a:buChar char="Ø"/>
+            </a:pPr>
+            <a:r>
+              <a:rPr lang="pt-BR" dirty="0">
+                <a:latin typeface="+mn-lt"/>
+              </a:rPr>
+              <a:t> Aplicação de variantes em jogos</a:t>
+            </a:r>
+          </a:p>
+          <a:p>
+            <a:pPr algn="just">
+              <a:buFont typeface="Wingdings" panose="05000000000000000000" pitchFamily="2" charset="2"/>
+              <a:buChar char="Ø"/>
+            </a:pPr>
+            <a:r>
+              <a:rPr lang="pt-BR" i="1" dirty="0">
+                <a:latin typeface="+mn-lt"/>
+              </a:rPr>
+              <a:t> </a:t>
+            </a:r>
+            <a:r>
+              <a:rPr lang="pt-BR" i="1" dirty="0" err="1">
+                <a:latin typeface="+mn-lt"/>
+              </a:rPr>
+              <a:t>Exploding</a:t>
+            </a:r>
+            <a:r>
+              <a:rPr lang="pt-BR" i="1" dirty="0">
+                <a:latin typeface="+mn-lt"/>
+              </a:rPr>
+              <a:t> </a:t>
+            </a:r>
+            <a:r>
+              <a:rPr lang="pt-BR" i="1" dirty="0" err="1">
+                <a:latin typeface="+mn-lt"/>
+              </a:rPr>
+              <a:t>Kittens</a:t>
+            </a:r>
+            <a:r>
+              <a:rPr lang="pt-BR" dirty="0">
+                <a:latin typeface="+mn-lt"/>
+              </a:rPr>
+              <a:t> e suas variantes</a:t>
+            </a:r>
+          </a:p>
+          <a:p>
+            <a:pPr algn="just">
+              <a:buFont typeface="Wingdings" panose="05000000000000000000" pitchFamily="2" charset="2"/>
+              <a:buChar char="Ø"/>
+            </a:pPr>
+            <a:r>
+              <a:rPr lang="pt-BR" dirty="0">
+                <a:latin typeface="+mn-lt"/>
+              </a:rPr>
+              <a:t> Jogos sérios</a:t>
+            </a:r>
+          </a:p>
+          <a:p>
+            <a:pPr algn="just">
+              <a:buFont typeface="Wingdings" panose="05000000000000000000" pitchFamily="2" charset="2"/>
+              <a:buChar char="Ø"/>
+            </a:pPr>
+            <a:r>
+              <a:rPr lang="pt-BR" dirty="0">
+                <a:latin typeface="+mn-lt"/>
+              </a:rPr>
+              <a:t> A criação do Xô Corona</a:t>
+            </a:r>
+          </a:p>
+        </p:txBody>
+      </p:sp>
+    </p:spTree>
+    <p:extLst>
+      <p:ext uri="{BB962C8B-B14F-4D97-AF65-F5344CB8AC3E}">
         <p14:creationId xmlns:p14="http://schemas.microsoft.com/office/powerpoint/2010/main" val="561619429"/>
       </p:ext>
     </p:extLst>
@@ -6509,7 +7656,7 @@
 </p:sld>
 </file>
 
-<file path=ppt/slides/slide3.xml><?xml version="1.0" encoding="utf-8"?>
+<file path=ppt/slides/slide4.xml><?xml version="1.0" encoding="utf-8"?>
 <p:sld xmlns:a="http://schemas.openxmlformats.org/drawingml/2006/main" xmlns:r="http://schemas.openxmlformats.org/officeDocument/2006/relationships" xmlns:p="http://schemas.openxmlformats.org/presentationml/2006/main">
   <p:cSld>
     <p:spTree>
@@ -6528,320 +7675,54 @@
       </p:grpSpPr>
       <p:sp>
         <p:nvSpPr>
-          <p:cNvPr id="6" name="Text Placeholder 5"/>
-          <p:cNvSpPr>
-            <a:spLocks noGrp="1"/>
-          </p:cNvSpPr>
-          <p:nvPr>
-            <p:ph type="body" idx="1"/>
-          </p:nvPr>
-        </p:nvSpPr>
-        <p:spPr>
-          <a:xfrm>
-            <a:off x="593141" y="4527798"/>
-            <a:ext cx="7946380" cy="1500187"/>
-          </a:xfrm>
-        </p:spPr>
+          <p:cNvPr id="2" name="Title 1"/>
+          <p:cNvSpPr>
+            <a:spLocks noGrp="1"/>
+          </p:cNvSpPr>
+          <p:nvPr>
+            <p:ph type="title"/>
+          </p:nvPr>
+        </p:nvSpPr>
+        <p:spPr/>
         <p:txBody>
           <a:bodyPr>
-            <a:normAutofit fontScale="25000" lnSpcReduction="20000"/>
+            <a:normAutofit/>
           </a:bodyPr>
           <a:lstStyle/>
           <a:p>
-            <a:pPr marL="0" marR="0" lvl="0" indent="0" algn="ctr" defTabSz="685800" rtl="0" eaLnBrk="1" fontAlgn="auto" latinLnBrk="0" hangingPunct="1">
-              <a:lnSpc>
-                <a:spcPct val="100000"/>
-              </a:lnSpc>
-              <a:spcBef>
-                <a:spcPts val="750"/>
-              </a:spcBef>
-              <a:spcAft>
-                <a:spcPts val="0"/>
-              </a:spcAft>
-              <a:buClrTx/>
-              <a:buSzPct val="95000"/>
-              <a:buFontTx/>
-              <a:buNone/>
-              <a:tabLst/>
-              <a:defRPr/>
-            </a:pPr>
-            <a:r>
-              <a:rPr kumimoji="0" lang="pt-BR" sz="11200" b="0" i="0" u="none" strike="noStrike" kern="1200" cap="small" spc="0" normalizeH="0" baseline="0" noProof="0" dirty="0">
-                <a:ln>
-                  <a:noFill/>
-                </a:ln>
-                <a:solidFill>
-                  <a:srgbClr val="2D719A"/>
-                </a:solidFill>
-                <a:effectLst/>
-                <a:uLnTx/>
-                <a:uFillTx/>
-                <a:latin typeface="Arial" panose="020B0604020202020204" pitchFamily="34" charset="0"/>
-                <a:ea typeface="Tahoma" panose="020B0604030504040204" pitchFamily="34" charset="0"/>
-                <a:cs typeface="Arial" panose="020B0604020202020204" pitchFamily="34" charset="0"/>
-              </a:rPr>
-              <a:t>Lincoln M. Costa</a:t>
-            </a:r>
-          </a:p>
-          <a:p>
-            <a:pPr marL="0" marR="0" lvl="0" indent="0" algn="ctr" defTabSz="685800" rtl="0" eaLnBrk="1" fontAlgn="auto" latinLnBrk="0" hangingPunct="1">
-              <a:lnSpc>
-                <a:spcPct val="100000"/>
-              </a:lnSpc>
-              <a:spcBef>
-                <a:spcPts val="750"/>
-              </a:spcBef>
-              <a:spcAft>
-                <a:spcPts val="0"/>
-              </a:spcAft>
-              <a:buClrTx/>
-              <a:buSzPct val="95000"/>
-              <a:buFontTx/>
-              <a:buNone/>
-              <a:tabLst/>
-              <a:defRPr/>
-            </a:pPr>
-            <a:r>
-              <a:rPr kumimoji="0" lang="pt-BR" sz="6400" b="0" i="0" u="none" strike="noStrike" kern="1200" cap="small" spc="0" normalizeH="0" baseline="0" noProof="0" dirty="0">
-                <a:ln>
-                  <a:noFill/>
-                </a:ln>
-                <a:solidFill>
-                  <a:srgbClr val="2D719A"/>
-                </a:solidFill>
-                <a:effectLst/>
-                <a:uLnTx/>
-                <a:uFillTx/>
-                <a:latin typeface="Arial" panose="020B0604020202020204" pitchFamily="34" charset="0"/>
-                <a:ea typeface="Tahoma" panose="020B0604030504040204" pitchFamily="34" charset="0"/>
-                <a:cs typeface="Arial" panose="020B0604020202020204" pitchFamily="34" charset="0"/>
-              </a:rPr>
-              <a:t>PESC/COPPE</a:t>
-            </a:r>
-          </a:p>
-          <a:p>
-            <a:pPr marL="0" marR="0" lvl="0" indent="0" algn="ctr" defTabSz="685800" rtl="0" eaLnBrk="1" fontAlgn="auto" latinLnBrk="0" hangingPunct="1">
-              <a:lnSpc>
-                <a:spcPct val="100000"/>
-              </a:lnSpc>
-              <a:spcBef>
-                <a:spcPts val="750"/>
-              </a:spcBef>
-              <a:spcAft>
-                <a:spcPts val="0"/>
-              </a:spcAft>
-              <a:buClrTx/>
-              <a:buSzPct val="95000"/>
-              <a:buFontTx/>
-              <a:buNone/>
-              <a:tabLst/>
-              <a:defRPr/>
-            </a:pPr>
-            <a:r>
-              <a:rPr kumimoji="0" lang="pt-BR" sz="6400" b="0" i="0" u="none" strike="noStrike" kern="1200" cap="small" spc="0" normalizeH="0" baseline="0" noProof="0" dirty="0">
-                <a:ln>
-                  <a:noFill/>
-                </a:ln>
-                <a:solidFill>
-                  <a:srgbClr val="2D719A"/>
-                </a:solidFill>
-                <a:effectLst/>
-                <a:uLnTx/>
-                <a:uFillTx/>
-                <a:latin typeface="Arial" panose="020B0604020202020204" pitchFamily="34" charset="0"/>
-                <a:ea typeface="Tahoma" panose="020B0604030504040204" pitchFamily="34" charset="0"/>
-                <a:cs typeface="Arial" panose="020B0604020202020204" pitchFamily="34" charset="0"/>
-              </a:rPr>
-              <a:t>Universidade Federal do Rio de Janeiro</a:t>
-            </a:r>
-          </a:p>
-          <a:p>
-            <a:pPr marL="0" marR="0" lvl="0" indent="0" algn="ctr" defTabSz="685800" rtl="0" eaLnBrk="1" fontAlgn="auto" latinLnBrk="0" hangingPunct="1">
-              <a:lnSpc>
-                <a:spcPct val="100000"/>
-              </a:lnSpc>
-              <a:spcBef>
-                <a:spcPts val="750"/>
-              </a:spcBef>
-              <a:spcAft>
-                <a:spcPts val="0"/>
-              </a:spcAft>
-              <a:buClrTx/>
-              <a:buSzPct val="95000"/>
-              <a:buFontTx/>
-              <a:buNone/>
-              <a:tabLst/>
-              <a:defRPr/>
-            </a:pPr>
-            <a:r>
-              <a:rPr kumimoji="0" lang="pt-BR" sz="3200" b="0" i="0" u="none" strike="noStrike" kern="1200" cap="small" spc="0" normalizeH="0" baseline="0" noProof="0" dirty="0">
-                <a:ln>
-                  <a:noFill/>
-                </a:ln>
-                <a:solidFill>
-                  <a:srgbClr val="2D719A"/>
-                </a:solidFill>
-                <a:effectLst/>
-                <a:uLnTx/>
-                <a:uFillTx/>
-                <a:latin typeface="Arial" panose="020B0604020202020204" pitchFamily="34" charset="0"/>
-                <a:ea typeface="Tahoma" panose="020B0604030504040204" pitchFamily="34" charset="0"/>
-                <a:cs typeface="Arial" panose="020B0604020202020204" pitchFamily="34" charset="0"/>
-                <a:hlinkClick r:id="rId2"/>
-              </a:rPr>
-              <a:t>costa@cos.ufrj.br</a:t>
-            </a:r>
-            <a:endParaRPr kumimoji="0" lang="pt-BR" sz="3200" b="0" i="0" u="none" strike="noStrike" kern="1200" cap="small" spc="0" normalizeH="0" baseline="0" noProof="0" dirty="0">
-              <a:ln>
-                <a:noFill/>
-              </a:ln>
-              <a:solidFill>
-                <a:srgbClr val="2D719A"/>
-              </a:solidFill>
-              <a:effectLst/>
-              <a:uLnTx/>
-              <a:uFillTx/>
-              <a:latin typeface="Arial" panose="020B0604020202020204" pitchFamily="34" charset="0"/>
-              <a:ea typeface="Tahoma" panose="020B0604030504040204" pitchFamily="34" charset="0"/>
-              <a:cs typeface="Arial" panose="020B0604020202020204" pitchFamily="34" charset="0"/>
-            </a:endParaRPr>
-          </a:p>
-          <a:p>
-            <a:pPr marL="0" marR="0" lvl="0" indent="0" algn="ctr" defTabSz="685800" rtl="0" eaLnBrk="1" fontAlgn="auto" latinLnBrk="0" hangingPunct="1">
-              <a:lnSpc>
-                <a:spcPct val="100000"/>
-              </a:lnSpc>
-              <a:spcBef>
-                <a:spcPts val="750"/>
-              </a:spcBef>
-              <a:spcAft>
-                <a:spcPts val="0"/>
-              </a:spcAft>
-              <a:buClrTx/>
-              <a:buSzPct val="95000"/>
-              <a:buFontTx/>
-              <a:buNone/>
-              <a:tabLst/>
-              <a:defRPr/>
-            </a:pPr>
-            <a:r>
-              <a:rPr kumimoji="0" lang="pt-BR" sz="3200" b="0" i="0" u="none" strike="noStrike" kern="1200" cap="small" spc="0" normalizeH="0" baseline="0" noProof="0" dirty="0">
-                <a:ln>
-                  <a:noFill/>
-                </a:ln>
-                <a:solidFill>
-                  <a:srgbClr val="2D719A"/>
-                </a:solidFill>
-                <a:effectLst/>
-                <a:uLnTx/>
-                <a:uFillTx/>
-                <a:latin typeface="Arial" panose="020B0604020202020204" pitchFamily="34" charset="0"/>
-                <a:ea typeface="Tahoma" panose="020B0604030504040204" pitchFamily="34" charset="0"/>
-                <a:cs typeface="Arial" panose="020B0604020202020204" pitchFamily="34" charset="0"/>
-                <a:hlinkClick r:id="rId3"/>
-              </a:rPr>
-              <a:t>http://ludes.cos.ufrj.br</a:t>
-            </a:r>
-            <a:endParaRPr kumimoji="0" lang="pt-BR" sz="3200" b="0" i="0" u="none" strike="noStrike" kern="1200" cap="small" spc="0" normalizeH="0" baseline="0" noProof="0" dirty="0">
-              <a:ln>
-                <a:noFill/>
-              </a:ln>
-              <a:solidFill>
-                <a:srgbClr val="2D719A"/>
-              </a:solidFill>
-              <a:effectLst/>
-              <a:uLnTx/>
-              <a:uFillTx/>
-              <a:latin typeface="Arial" panose="020B0604020202020204" pitchFamily="34" charset="0"/>
-              <a:ea typeface="Tahoma" panose="020B0604030504040204" pitchFamily="34" charset="0"/>
-              <a:cs typeface="Arial" panose="020B0604020202020204" pitchFamily="34" charset="0"/>
-            </a:endParaRPr>
-          </a:p>
-          <a:p>
-            <a:pPr marL="0" marR="0" lvl="0" indent="0" algn="ctr" defTabSz="685800" rtl="0" eaLnBrk="1" fontAlgn="auto" latinLnBrk="0" hangingPunct="1">
-              <a:lnSpc>
-                <a:spcPct val="100000"/>
-              </a:lnSpc>
-              <a:spcBef>
-                <a:spcPts val="750"/>
-              </a:spcBef>
-              <a:spcAft>
-                <a:spcPts val="0"/>
-              </a:spcAft>
-              <a:buClrTx/>
-              <a:buSzPct val="95000"/>
-              <a:buFontTx/>
-              <a:buNone/>
-              <a:tabLst/>
-              <a:defRPr/>
-            </a:pPr>
-            <a:r>
-              <a:rPr kumimoji="0" lang="pt-BR" sz="3200" b="0" i="0" u="none" strike="noStrike" kern="1200" cap="small" spc="0" normalizeH="0" baseline="0" noProof="0" dirty="0">
-                <a:ln>
-                  <a:noFill/>
-                </a:ln>
-                <a:solidFill>
-                  <a:srgbClr val="2D719A"/>
-                </a:solidFill>
-                <a:effectLst/>
-                <a:uLnTx/>
-                <a:uFillTx/>
-                <a:latin typeface="Arial" panose="020B0604020202020204" pitchFamily="34" charset="0"/>
-                <a:ea typeface="Tahoma" panose="020B0604030504040204" pitchFamily="34" charset="0"/>
-                <a:cs typeface="Arial" panose="020B0604020202020204" pitchFamily="34" charset="0"/>
-                <a:hlinkClick r:id="rId4" action="ppaction://hlinkfile"/>
-              </a:rPr>
-              <a:t>tekpixo.github.io</a:t>
-            </a:r>
-            <a:r>
-              <a:rPr kumimoji="0" lang="pt-BR" sz="3200" b="0" i="0" u="none" strike="noStrike" kern="1200" cap="small" spc="0" normalizeH="0" baseline="0" noProof="0" dirty="0">
-                <a:ln>
-                  <a:noFill/>
-                </a:ln>
-                <a:solidFill>
-                  <a:srgbClr val="2D719A"/>
-                </a:solidFill>
-                <a:effectLst/>
-                <a:uLnTx/>
-                <a:uFillTx/>
-                <a:latin typeface="Arial" panose="020B0604020202020204" pitchFamily="34" charset="0"/>
-                <a:ea typeface="Tahoma" panose="020B0604030504040204" pitchFamily="34" charset="0"/>
-                <a:cs typeface="Arial" panose="020B0604020202020204" pitchFamily="34" charset="0"/>
-              </a:rPr>
-              <a:t> </a:t>
-            </a:r>
-          </a:p>
-          <a:p>
+            <a:r>
+              <a:rPr lang="pt-BR" dirty="0"/>
+              <a:t>Introdução</a:t>
+            </a:r>
+          </a:p>
+        </p:txBody>
+      </p:sp>
+      <p:sp>
+        <p:nvSpPr>
+          <p:cNvPr id="17" name="Date Placeholder 16"/>
+          <p:cNvSpPr>
+            <a:spLocks noGrp="1"/>
+          </p:cNvSpPr>
+          <p:nvPr>
+            <p:ph type="dt" sz="half" idx="10"/>
+          </p:nvPr>
+        </p:nvSpPr>
+        <p:spPr/>
+        <p:txBody>
+          <a:bodyPr/>
+          <a:lstStyle/>
+          <a:p>
+            <a:r>
+              <a:rPr lang="en-US" dirty="0"/>
+              <a:t>LUDES</a:t>
+            </a:r>
             <a:endParaRPr lang="pt-BR" dirty="0"/>
           </a:p>
         </p:txBody>
       </p:sp>
       <p:sp>
         <p:nvSpPr>
-          <p:cNvPr id="2" name="Date Placeholder 1"/>
-          <p:cNvSpPr>
-            <a:spLocks noGrp="1"/>
-          </p:cNvSpPr>
-          <p:nvPr>
-            <p:ph type="dt" sz="half" idx="10"/>
-          </p:nvPr>
-        </p:nvSpPr>
-        <p:spPr/>
-        <p:txBody>
-          <a:bodyPr/>
-          <a:lstStyle/>
-          <a:p>
-            <a:r>
-              <a:rPr lang="en-US"/>
-              <a:t>LUDES</a:t>
-            </a:r>
-            <a:endParaRPr lang="pt-BR"/>
-          </a:p>
-        </p:txBody>
-      </p:sp>
-      <p:sp>
-        <p:nvSpPr>
-          <p:cNvPr id="3" name="Footer Placeholder 2"/>
+          <p:cNvPr id="18" name="Footer Placeholder 17"/>
           <p:cNvSpPr>
             <a:spLocks noGrp="1"/>
           </p:cNvSpPr>
@@ -6863,7 +7744,7 @@
       </p:sp>
       <p:sp>
         <p:nvSpPr>
-          <p:cNvPr id="4" name="Slide Number Placeholder 3"/>
+          <p:cNvPr id="20" name="Slide Number Placeholder 19"/>
           <p:cNvSpPr>
             <a:spLocks noGrp="1"/>
           </p:cNvSpPr>
@@ -6879,30 +7760,82 @@
             <a:fld id="{BB152AAB-E794-4AAE-96FF-3CDB8C5C9FC8}" type="slidenum">
               <a:rPr lang="pt-BR" smtClean="0"/>
               <a:pPr/>
-              <a:t>3</a:t>
+              <a:t>4</a:t>
             </a:fld>
-            <a:endParaRPr lang="pt-BR"/>
-          </a:p>
-        </p:txBody>
-      </p:sp>
-      <p:sp>
-        <p:nvSpPr>
-          <p:cNvPr id="5" name="Title 4"/>
-          <p:cNvSpPr>
-            <a:spLocks noGrp="1"/>
-          </p:cNvSpPr>
-          <p:nvPr>
-            <p:ph type="title"/>
-          </p:nvPr>
-        </p:nvSpPr>
-        <p:spPr/>
-        <p:txBody>
-          <a:bodyPr/>
-          <a:lstStyle/>
-          <a:p>
+            <a:endParaRPr lang="pt-BR" dirty="0"/>
+          </a:p>
+        </p:txBody>
+      </p:sp>
+      <p:sp>
+        <p:nvSpPr>
+          <p:cNvPr id="7" name="Espaço Reservado para Conteúdo 6">
+            <a:extLst>
+              <a:ext uri="{FF2B5EF4-FFF2-40B4-BE49-F238E27FC236}">
+                <a16:creationId xmlns:a16="http://schemas.microsoft.com/office/drawing/2014/main" id="{970ABBE5-C615-480E-84AC-B73FB7BF52AD}"/>
+              </a:ext>
+            </a:extLst>
+          </p:cNvPr>
+          <p:cNvSpPr>
+            <a:spLocks noGrp="1"/>
+          </p:cNvSpPr>
+          <p:nvPr>
+            <p:ph sz="quarter" idx="13"/>
+          </p:nvPr>
+        </p:nvSpPr>
+        <p:spPr/>
+        <p:txBody>
+          <a:bodyPr/>
+          <a:lstStyle/>
+          <a:p>
+            <a:pPr algn="just">
+              <a:buFont typeface="Wingdings" panose="05000000000000000000" pitchFamily="2" charset="2"/>
+              <a:buChar char="Ø"/>
+            </a:pPr>
             <a:r>
               <a:rPr lang="pt-BR" dirty="0"/>
-              <a:t>Obrigado pela atenção!</a:t>
+              <a:t> </a:t>
+            </a:r>
+            <a:r>
+              <a:rPr lang="pt-BR" dirty="0">
+                <a:latin typeface="+mn-lt"/>
+              </a:rPr>
+              <a:t>Dificuldades na criação de novos jogos:</a:t>
+            </a:r>
+          </a:p>
+          <a:p>
+            <a:pPr algn="just">
+              <a:buFont typeface="Wingdings" panose="05000000000000000000" pitchFamily="2" charset="2"/>
+              <a:buChar char="Ø"/>
+            </a:pPr>
+            <a:r>
+              <a:rPr lang="pt-BR" dirty="0">
+                <a:latin typeface="+mn-lt"/>
+              </a:rPr>
+              <a:t> Variantes destacam-se para sanar essas dificuldades.</a:t>
+            </a:r>
+          </a:p>
+          <a:p>
+            <a:pPr algn="just">
+              <a:buFont typeface="Wingdings" panose="05000000000000000000" pitchFamily="2" charset="2"/>
+              <a:buChar char="Ø"/>
+            </a:pPr>
+            <a:r>
+              <a:rPr lang="pt-BR" dirty="0">
+                <a:latin typeface="+mn-lt"/>
+              </a:rPr>
+              <a:t> Pandemia do novo coronavírus.</a:t>
+            </a:r>
+          </a:p>
+          <a:p>
+            <a:pPr algn="just">
+              <a:buFont typeface="Wingdings" panose="05000000000000000000" pitchFamily="2" charset="2"/>
+              <a:buChar char="Ø"/>
+            </a:pPr>
+            <a:r>
+              <a:rPr lang="pt-BR" dirty="0">
+                <a:latin typeface="+mn-lt"/>
+              </a:rPr>
+              <a:t> Criação de um jogo digital com viés educativo para disseminação de informações sobre como prevenir-se do COVID-19.</a:t>
             </a:r>
           </a:p>
         </p:txBody>
@@ -6910,7 +7843,755 @@
     </p:spTree>
     <p:extLst>
       <p:ext uri="{BB962C8B-B14F-4D97-AF65-F5344CB8AC3E}">
-        <p14:creationId xmlns:p14="http://schemas.microsoft.com/office/powerpoint/2010/main" val="314318472"/>
+        <p14:creationId xmlns:p14="http://schemas.microsoft.com/office/powerpoint/2010/main" val="1422952999"/>
+      </p:ext>
+    </p:extLst>
+  </p:cSld>
+  <p:clrMapOvr>
+    <a:masterClrMapping/>
+  </p:clrMapOvr>
+</p:sld>
+</file>
+
+<file path=ppt/slides/slide5.xml><?xml version="1.0" encoding="utf-8"?>
+<p:sld xmlns:a="http://schemas.openxmlformats.org/drawingml/2006/main" xmlns:r="http://schemas.openxmlformats.org/officeDocument/2006/relationships" xmlns:p="http://schemas.openxmlformats.org/presentationml/2006/main">
+  <p:cSld>
+    <p:spTree>
+      <p:nvGrpSpPr>
+        <p:cNvPr id="1" name=""/>
+        <p:cNvGrpSpPr/>
+        <p:nvPr/>
+      </p:nvGrpSpPr>
+      <p:grpSpPr>
+        <a:xfrm>
+          <a:off x="0" y="0"/>
+          <a:ext cx="0" cy="0"/>
+          <a:chOff x="0" y="0"/>
+          <a:chExt cx="0" cy="0"/>
+        </a:xfrm>
+      </p:grpSpPr>
+      <p:sp>
+        <p:nvSpPr>
+          <p:cNvPr id="2" name="Title 1"/>
+          <p:cNvSpPr>
+            <a:spLocks noGrp="1"/>
+          </p:cNvSpPr>
+          <p:nvPr>
+            <p:ph type="title"/>
+          </p:nvPr>
+        </p:nvSpPr>
+        <p:spPr/>
+        <p:txBody>
+          <a:bodyPr>
+            <a:normAutofit/>
+          </a:bodyPr>
+          <a:lstStyle/>
+          <a:p>
+            <a:r>
+              <a:rPr lang="pt-BR" dirty="0"/>
+              <a:t>O que são variantes?</a:t>
+            </a:r>
+          </a:p>
+        </p:txBody>
+      </p:sp>
+      <p:sp>
+        <p:nvSpPr>
+          <p:cNvPr id="17" name="Date Placeholder 16"/>
+          <p:cNvSpPr>
+            <a:spLocks noGrp="1"/>
+          </p:cNvSpPr>
+          <p:nvPr>
+            <p:ph type="dt" sz="half" idx="10"/>
+          </p:nvPr>
+        </p:nvSpPr>
+        <p:spPr/>
+        <p:txBody>
+          <a:bodyPr/>
+          <a:lstStyle/>
+          <a:p>
+            <a:r>
+              <a:rPr lang="en-US" dirty="0"/>
+              <a:t>LUDES</a:t>
+            </a:r>
+            <a:endParaRPr lang="pt-BR" dirty="0"/>
+          </a:p>
+        </p:txBody>
+      </p:sp>
+      <p:sp>
+        <p:nvSpPr>
+          <p:cNvPr id="18" name="Footer Placeholder 17"/>
+          <p:cNvSpPr>
+            <a:spLocks noGrp="1"/>
+          </p:cNvSpPr>
+          <p:nvPr>
+            <p:ph type="ftr" sz="quarter" idx="11"/>
+          </p:nvPr>
+        </p:nvSpPr>
+        <p:spPr/>
+        <p:txBody>
+          <a:bodyPr/>
+          <a:lstStyle/>
+          <a:p>
+            <a:r>
+              <a:rPr lang="pt-BR" dirty="0"/>
+              <a:t>Lincoln Costa / costa@cos.ufrj.br</a:t>
+            </a:r>
+          </a:p>
+        </p:txBody>
+      </p:sp>
+      <p:sp>
+        <p:nvSpPr>
+          <p:cNvPr id="20" name="Slide Number Placeholder 19"/>
+          <p:cNvSpPr>
+            <a:spLocks noGrp="1"/>
+          </p:cNvSpPr>
+          <p:nvPr>
+            <p:ph type="sldNum" sz="quarter" idx="12"/>
+          </p:nvPr>
+        </p:nvSpPr>
+        <p:spPr/>
+        <p:txBody>
+          <a:bodyPr/>
+          <a:lstStyle/>
+          <a:p>
+            <a:fld id="{BB152AAB-E794-4AAE-96FF-3CDB8C5C9FC8}" type="slidenum">
+              <a:rPr lang="pt-BR" smtClean="0"/>
+              <a:pPr/>
+              <a:t>5</a:t>
+            </a:fld>
+            <a:endParaRPr lang="pt-BR" dirty="0"/>
+          </a:p>
+        </p:txBody>
+      </p:sp>
+      <p:sp>
+        <p:nvSpPr>
+          <p:cNvPr id="7" name="Espaço Reservado para Conteúdo 6">
+            <a:extLst>
+              <a:ext uri="{FF2B5EF4-FFF2-40B4-BE49-F238E27FC236}">
+                <a16:creationId xmlns:a16="http://schemas.microsoft.com/office/drawing/2014/main" id="{970ABBE5-C615-480E-84AC-B73FB7BF52AD}"/>
+              </a:ext>
+            </a:extLst>
+          </p:cNvPr>
+          <p:cNvSpPr>
+            <a:spLocks noGrp="1"/>
+          </p:cNvSpPr>
+          <p:nvPr>
+            <p:ph sz="quarter" idx="13"/>
+          </p:nvPr>
+        </p:nvSpPr>
+        <p:spPr/>
+        <p:txBody>
+          <a:bodyPr/>
+          <a:lstStyle/>
+          <a:p>
+            <a:endParaRPr lang="pt-BR"/>
+          </a:p>
+        </p:txBody>
+      </p:sp>
+    </p:spTree>
+    <p:extLst>
+      <p:ext uri="{BB962C8B-B14F-4D97-AF65-F5344CB8AC3E}">
+        <p14:creationId xmlns:p14="http://schemas.microsoft.com/office/powerpoint/2010/main" val="3835438671"/>
+      </p:ext>
+    </p:extLst>
+  </p:cSld>
+  <p:clrMapOvr>
+    <a:masterClrMapping/>
+  </p:clrMapOvr>
+</p:sld>
+</file>
+
+<file path=ppt/slides/slide6.xml><?xml version="1.0" encoding="utf-8"?>
+<p:sld xmlns:a="http://schemas.openxmlformats.org/drawingml/2006/main" xmlns:r="http://schemas.openxmlformats.org/officeDocument/2006/relationships" xmlns:p="http://schemas.openxmlformats.org/presentationml/2006/main">
+  <p:cSld>
+    <p:spTree>
+      <p:nvGrpSpPr>
+        <p:cNvPr id="1" name=""/>
+        <p:cNvGrpSpPr/>
+        <p:nvPr/>
+      </p:nvGrpSpPr>
+      <p:grpSpPr>
+        <a:xfrm>
+          <a:off x="0" y="0"/>
+          <a:ext cx="0" cy="0"/>
+          <a:chOff x="0" y="0"/>
+          <a:chExt cx="0" cy="0"/>
+        </a:xfrm>
+      </p:grpSpPr>
+      <p:sp>
+        <p:nvSpPr>
+          <p:cNvPr id="2" name="Title 1"/>
+          <p:cNvSpPr>
+            <a:spLocks noGrp="1"/>
+          </p:cNvSpPr>
+          <p:nvPr>
+            <p:ph type="title"/>
+          </p:nvPr>
+        </p:nvSpPr>
+        <p:spPr/>
+        <p:txBody>
+          <a:bodyPr>
+            <a:normAutofit fontScale="90000"/>
+          </a:bodyPr>
+          <a:lstStyle/>
+          <a:p>
+            <a:r>
+              <a:rPr lang="pt-BR" dirty="0"/>
+              <a:t>Aplicação de variantes em jogos</a:t>
+            </a:r>
+          </a:p>
+        </p:txBody>
+      </p:sp>
+      <p:sp>
+        <p:nvSpPr>
+          <p:cNvPr id="17" name="Date Placeholder 16"/>
+          <p:cNvSpPr>
+            <a:spLocks noGrp="1"/>
+          </p:cNvSpPr>
+          <p:nvPr>
+            <p:ph type="dt" sz="half" idx="10"/>
+          </p:nvPr>
+        </p:nvSpPr>
+        <p:spPr/>
+        <p:txBody>
+          <a:bodyPr/>
+          <a:lstStyle/>
+          <a:p>
+            <a:r>
+              <a:rPr lang="en-US" dirty="0"/>
+              <a:t>LUDES</a:t>
+            </a:r>
+            <a:endParaRPr lang="pt-BR" dirty="0"/>
+          </a:p>
+        </p:txBody>
+      </p:sp>
+      <p:sp>
+        <p:nvSpPr>
+          <p:cNvPr id="18" name="Footer Placeholder 17"/>
+          <p:cNvSpPr>
+            <a:spLocks noGrp="1"/>
+          </p:cNvSpPr>
+          <p:nvPr>
+            <p:ph type="ftr" sz="quarter" idx="11"/>
+          </p:nvPr>
+        </p:nvSpPr>
+        <p:spPr/>
+        <p:txBody>
+          <a:bodyPr/>
+          <a:lstStyle/>
+          <a:p>
+            <a:r>
+              <a:rPr lang="pt-BR" dirty="0"/>
+              <a:t>Lincoln Costa / costa@cos.ufrj.br</a:t>
+            </a:r>
+          </a:p>
+        </p:txBody>
+      </p:sp>
+      <p:sp>
+        <p:nvSpPr>
+          <p:cNvPr id="20" name="Slide Number Placeholder 19"/>
+          <p:cNvSpPr>
+            <a:spLocks noGrp="1"/>
+          </p:cNvSpPr>
+          <p:nvPr>
+            <p:ph type="sldNum" sz="quarter" idx="12"/>
+          </p:nvPr>
+        </p:nvSpPr>
+        <p:spPr/>
+        <p:txBody>
+          <a:bodyPr/>
+          <a:lstStyle/>
+          <a:p>
+            <a:fld id="{BB152AAB-E794-4AAE-96FF-3CDB8C5C9FC8}" type="slidenum">
+              <a:rPr lang="pt-BR" smtClean="0"/>
+              <a:pPr/>
+              <a:t>6</a:t>
+            </a:fld>
+            <a:endParaRPr lang="pt-BR" dirty="0"/>
+          </a:p>
+        </p:txBody>
+      </p:sp>
+      <p:sp>
+        <p:nvSpPr>
+          <p:cNvPr id="7" name="Espaço Reservado para Conteúdo 6">
+            <a:extLst>
+              <a:ext uri="{FF2B5EF4-FFF2-40B4-BE49-F238E27FC236}">
+                <a16:creationId xmlns:a16="http://schemas.microsoft.com/office/drawing/2014/main" id="{970ABBE5-C615-480E-84AC-B73FB7BF52AD}"/>
+              </a:ext>
+            </a:extLst>
+          </p:cNvPr>
+          <p:cNvSpPr>
+            <a:spLocks noGrp="1"/>
+          </p:cNvSpPr>
+          <p:nvPr>
+            <p:ph sz="quarter" idx="13"/>
+          </p:nvPr>
+        </p:nvSpPr>
+        <p:spPr/>
+        <p:txBody>
+          <a:bodyPr/>
+          <a:lstStyle/>
+          <a:p>
+            <a:endParaRPr lang="pt-BR"/>
+          </a:p>
+        </p:txBody>
+      </p:sp>
+    </p:spTree>
+    <p:extLst>
+      <p:ext uri="{BB962C8B-B14F-4D97-AF65-F5344CB8AC3E}">
+        <p14:creationId xmlns:p14="http://schemas.microsoft.com/office/powerpoint/2010/main" val="259244636"/>
+      </p:ext>
+    </p:extLst>
+  </p:cSld>
+  <p:clrMapOvr>
+    <a:masterClrMapping/>
+  </p:clrMapOvr>
+</p:sld>
+</file>
+
+<file path=ppt/slides/slide7.xml><?xml version="1.0" encoding="utf-8"?>
+<p:sld xmlns:a="http://schemas.openxmlformats.org/drawingml/2006/main" xmlns:r="http://schemas.openxmlformats.org/officeDocument/2006/relationships" xmlns:p="http://schemas.openxmlformats.org/presentationml/2006/main">
+  <p:cSld>
+    <p:spTree>
+      <p:nvGrpSpPr>
+        <p:cNvPr id="1" name=""/>
+        <p:cNvGrpSpPr/>
+        <p:nvPr/>
+      </p:nvGrpSpPr>
+      <p:grpSpPr>
+        <a:xfrm>
+          <a:off x="0" y="0"/>
+          <a:ext cx="0" cy="0"/>
+          <a:chOff x="0" y="0"/>
+          <a:chExt cx="0" cy="0"/>
+        </a:xfrm>
+      </p:grpSpPr>
+      <p:sp>
+        <p:nvSpPr>
+          <p:cNvPr id="2" name="Title 1"/>
+          <p:cNvSpPr>
+            <a:spLocks noGrp="1"/>
+          </p:cNvSpPr>
+          <p:nvPr>
+            <p:ph type="title"/>
+          </p:nvPr>
+        </p:nvSpPr>
+        <p:spPr/>
+        <p:txBody>
+          <a:bodyPr>
+            <a:normAutofit fontScale="90000"/>
+          </a:bodyPr>
+          <a:lstStyle/>
+          <a:p>
+            <a:r>
+              <a:rPr lang="pt-BR" dirty="0" err="1"/>
+              <a:t>Exploding</a:t>
+            </a:r>
+            <a:r>
+              <a:rPr lang="pt-BR" dirty="0"/>
+              <a:t> </a:t>
+            </a:r>
+            <a:r>
+              <a:rPr lang="pt-BR" dirty="0" err="1"/>
+              <a:t>Kittens</a:t>
+            </a:r>
+            <a:r>
+              <a:rPr lang="pt-BR" dirty="0"/>
+              <a:t> e suas variantes</a:t>
+            </a:r>
+          </a:p>
+        </p:txBody>
+      </p:sp>
+      <p:sp>
+        <p:nvSpPr>
+          <p:cNvPr id="17" name="Date Placeholder 16"/>
+          <p:cNvSpPr>
+            <a:spLocks noGrp="1"/>
+          </p:cNvSpPr>
+          <p:nvPr>
+            <p:ph type="dt" sz="half" idx="10"/>
+          </p:nvPr>
+        </p:nvSpPr>
+        <p:spPr/>
+        <p:txBody>
+          <a:bodyPr/>
+          <a:lstStyle/>
+          <a:p>
+            <a:r>
+              <a:rPr lang="en-US" dirty="0"/>
+              <a:t>LUDES</a:t>
+            </a:r>
+            <a:endParaRPr lang="pt-BR" dirty="0"/>
+          </a:p>
+        </p:txBody>
+      </p:sp>
+      <p:sp>
+        <p:nvSpPr>
+          <p:cNvPr id="18" name="Footer Placeholder 17"/>
+          <p:cNvSpPr>
+            <a:spLocks noGrp="1"/>
+          </p:cNvSpPr>
+          <p:nvPr>
+            <p:ph type="ftr" sz="quarter" idx="11"/>
+          </p:nvPr>
+        </p:nvSpPr>
+        <p:spPr/>
+        <p:txBody>
+          <a:bodyPr/>
+          <a:lstStyle/>
+          <a:p>
+            <a:r>
+              <a:rPr lang="pt-BR" dirty="0"/>
+              <a:t>Lincoln Costa / costa@cos.ufrj.br</a:t>
+            </a:r>
+          </a:p>
+        </p:txBody>
+      </p:sp>
+      <p:sp>
+        <p:nvSpPr>
+          <p:cNvPr id="20" name="Slide Number Placeholder 19"/>
+          <p:cNvSpPr>
+            <a:spLocks noGrp="1"/>
+          </p:cNvSpPr>
+          <p:nvPr>
+            <p:ph type="sldNum" sz="quarter" idx="12"/>
+          </p:nvPr>
+        </p:nvSpPr>
+        <p:spPr/>
+        <p:txBody>
+          <a:bodyPr/>
+          <a:lstStyle/>
+          <a:p>
+            <a:fld id="{BB152AAB-E794-4AAE-96FF-3CDB8C5C9FC8}" type="slidenum">
+              <a:rPr lang="pt-BR" smtClean="0"/>
+              <a:pPr/>
+              <a:t>7</a:t>
+            </a:fld>
+            <a:endParaRPr lang="pt-BR" dirty="0"/>
+          </a:p>
+        </p:txBody>
+      </p:sp>
+      <p:sp>
+        <p:nvSpPr>
+          <p:cNvPr id="7" name="Espaço Reservado para Conteúdo 6">
+            <a:extLst>
+              <a:ext uri="{FF2B5EF4-FFF2-40B4-BE49-F238E27FC236}">
+                <a16:creationId xmlns:a16="http://schemas.microsoft.com/office/drawing/2014/main" id="{970ABBE5-C615-480E-84AC-B73FB7BF52AD}"/>
+              </a:ext>
+            </a:extLst>
+          </p:cNvPr>
+          <p:cNvSpPr>
+            <a:spLocks noGrp="1"/>
+          </p:cNvSpPr>
+          <p:nvPr>
+            <p:ph sz="quarter" idx="13"/>
+          </p:nvPr>
+        </p:nvSpPr>
+        <p:spPr/>
+        <p:txBody>
+          <a:bodyPr/>
+          <a:lstStyle/>
+          <a:p>
+            <a:endParaRPr lang="pt-BR"/>
+          </a:p>
+        </p:txBody>
+      </p:sp>
+    </p:spTree>
+    <p:extLst>
+      <p:ext uri="{BB962C8B-B14F-4D97-AF65-F5344CB8AC3E}">
+        <p14:creationId xmlns:p14="http://schemas.microsoft.com/office/powerpoint/2010/main" val="2748571352"/>
+      </p:ext>
+    </p:extLst>
+  </p:cSld>
+  <p:clrMapOvr>
+    <a:masterClrMapping/>
+  </p:clrMapOvr>
+</p:sld>
+</file>
+
+<file path=ppt/slides/slide8.xml><?xml version="1.0" encoding="utf-8"?>
+<p:sld xmlns:a="http://schemas.openxmlformats.org/drawingml/2006/main" xmlns:r="http://schemas.openxmlformats.org/officeDocument/2006/relationships" xmlns:p="http://schemas.openxmlformats.org/presentationml/2006/main">
+  <p:cSld>
+    <p:spTree>
+      <p:nvGrpSpPr>
+        <p:cNvPr id="1" name=""/>
+        <p:cNvGrpSpPr/>
+        <p:nvPr/>
+      </p:nvGrpSpPr>
+      <p:grpSpPr>
+        <a:xfrm>
+          <a:off x="0" y="0"/>
+          <a:ext cx="0" cy="0"/>
+          <a:chOff x="0" y="0"/>
+          <a:chExt cx="0" cy="0"/>
+        </a:xfrm>
+      </p:grpSpPr>
+      <p:sp>
+        <p:nvSpPr>
+          <p:cNvPr id="2" name="Title 1"/>
+          <p:cNvSpPr>
+            <a:spLocks noGrp="1"/>
+          </p:cNvSpPr>
+          <p:nvPr>
+            <p:ph type="title"/>
+          </p:nvPr>
+        </p:nvSpPr>
+        <p:spPr/>
+        <p:txBody>
+          <a:bodyPr/>
+          <a:lstStyle/>
+          <a:p>
+            <a:r>
+              <a:rPr lang="pt-BR" dirty="0"/>
+              <a:t>Jogos sérios</a:t>
+            </a:r>
+          </a:p>
+        </p:txBody>
+      </p:sp>
+      <p:sp>
+        <p:nvSpPr>
+          <p:cNvPr id="17" name="Date Placeholder 16"/>
+          <p:cNvSpPr>
+            <a:spLocks noGrp="1"/>
+          </p:cNvSpPr>
+          <p:nvPr>
+            <p:ph type="dt" sz="half" idx="10"/>
+          </p:nvPr>
+        </p:nvSpPr>
+        <p:spPr/>
+        <p:txBody>
+          <a:bodyPr/>
+          <a:lstStyle/>
+          <a:p>
+            <a:r>
+              <a:rPr lang="en-US" dirty="0"/>
+              <a:t>LUDES</a:t>
+            </a:r>
+            <a:endParaRPr lang="pt-BR" dirty="0"/>
+          </a:p>
+        </p:txBody>
+      </p:sp>
+      <p:sp>
+        <p:nvSpPr>
+          <p:cNvPr id="18" name="Footer Placeholder 17"/>
+          <p:cNvSpPr>
+            <a:spLocks noGrp="1"/>
+          </p:cNvSpPr>
+          <p:nvPr>
+            <p:ph type="ftr" sz="quarter" idx="11"/>
+          </p:nvPr>
+        </p:nvSpPr>
+        <p:spPr/>
+        <p:txBody>
+          <a:bodyPr/>
+          <a:lstStyle/>
+          <a:p>
+            <a:r>
+              <a:rPr lang="pt-BR" dirty="0"/>
+              <a:t>Lincoln Costa / costa@cos.ufrj.br</a:t>
+            </a:r>
+          </a:p>
+        </p:txBody>
+      </p:sp>
+      <p:sp>
+        <p:nvSpPr>
+          <p:cNvPr id="20" name="Slide Number Placeholder 19"/>
+          <p:cNvSpPr>
+            <a:spLocks noGrp="1"/>
+          </p:cNvSpPr>
+          <p:nvPr>
+            <p:ph type="sldNum" sz="quarter" idx="12"/>
+          </p:nvPr>
+        </p:nvSpPr>
+        <p:spPr/>
+        <p:txBody>
+          <a:bodyPr/>
+          <a:lstStyle/>
+          <a:p>
+            <a:fld id="{BB152AAB-E794-4AAE-96FF-3CDB8C5C9FC8}" type="slidenum">
+              <a:rPr lang="pt-BR" smtClean="0"/>
+              <a:pPr/>
+              <a:t>8</a:t>
+            </a:fld>
+            <a:endParaRPr lang="pt-BR" dirty="0"/>
+          </a:p>
+        </p:txBody>
+      </p:sp>
+      <p:sp>
+        <p:nvSpPr>
+          <p:cNvPr id="7" name="Espaço Reservado para Conteúdo 6">
+            <a:extLst>
+              <a:ext uri="{FF2B5EF4-FFF2-40B4-BE49-F238E27FC236}">
+                <a16:creationId xmlns:a16="http://schemas.microsoft.com/office/drawing/2014/main" id="{970ABBE5-C615-480E-84AC-B73FB7BF52AD}"/>
+              </a:ext>
+            </a:extLst>
+          </p:cNvPr>
+          <p:cNvSpPr>
+            <a:spLocks noGrp="1"/>
+          </p:cNvSpPr>
+          <p:nvPr>
+            <p:ph sz="quarter" idx="13"/>
+          </p:nvPr>
+        </p:nvSpPr>
+        <p:spPr/>
+        <p:txBody>
+          <a:bodyPr/>
+          <a:lstStyle/>
+          <a:p>
+            <a:endParaRPr lang="pt-BR"/>
+          </a:p>
+        </p:txBody>
+      </p:sp>
+    </p:spTree>
+    <p:extLst>
+      <p:ext uri="{BB962C8B-B14F-4D97-AF65-F5344CB8AC3E}">
+        <p14:creationId xmlns:p14="http://schemas.microsoft.com/office/powerpoint/2010/main" val="3654111276"/>
+      </p:ext>
+    </p:extLst>
+  </p:cSld>
+  <p:clrMapOvr>
+    <a:masterClrMapping/>
+  </p:clrMapOvr>
+</p:sld>
+</file>
+
+<file path=ppt/slides/slide9.xml><?xml version="1.0" encoding="utf-8"?>
+<p:sld xmlns:a="http://schemas.openxmlformats.org/drawingml/2006/main" xmlns:r="http://schemas.openxmlformats.org/officeDocument/2006/relationships" xmlns:p="http://schemas.openxmlformats.org/presentationml/2006/main">
+  <p:cSld>
+    <p:spTree>
+      <p:nvGrpSpPr>
+        <p:cNvPr id="1" name=""/>
+        <p:cNvGrpSpPr/>
+        <p:nvPr/>
+      </p:nvGrpSpPr>
+      <p:grpSpPr>
+        <a:xfrm>
+          <a:off x="0" y="0"/>
+          <a:ext cx="0" cy="0"/>
+          <a:chOff x="0" y="0"/>
+          <a:chExt cx="0" cy="0"/>
+        </a:xfrm>
+      </p:grpSpPr>
+      <p:sp>
+        <p:nvSpPr>
+          <p:cNvPr id="2" name="Title 1"/>
+          <p:cNvSpPr>
+            <a:spLocks noGrp="1"/>
+          </p:cNvSpPr>
+          <p:nvPr>
+            <p:ph type="title"/>
+          </p:nvPr>
+        </p:nvSpPr>
+        <p:spPr/>
+        <p:txBody>
+          <a:bodyPr/>
+          <a:lstStyle/>
+          <a:p>
+            <a:r>
+              <a:rPr lang="pt-BR" dirty="0"/>
+              <a:t>A Criação do Xô Corona</a:t>
+            </a:r>
+          </a:p>
+        </p:txBody>
+      </p:sp>
+      <p:sp>
+        <p:nvSpPr>
+          <p:cNvPr id="17" name="Date Placeholder 16"/>
+          <p:cNvSpPr>
+            <a:spLocks noGrp="1"/>
+          </p:cNvSpPr>
+          <p:nvPr>
+            <p:ph type="dt" sz="half" idx="10"/>
+          </p:nvPr>
+        </p:nvSpPr>
+        <p:spPr/>
+        <p:txBody>
+          <a:bodyPr/>
+          <a:lstStyle/>
+          <a:p>
+            <a:r>
+              <a:rPr lang="en-US" dirty="0"/>
+              <a:t>LUDES</a:t>
+            </a:r>
+            <a:endParaRPr lang="pt-BR" dirty="0"/>
+          </a:p>
+        </p:txBody>
+      </p:sp>
+      <p:sp>
+        <p:nvSpPr>
+          <p:cNvPr id="18" name="Footer Placeholder 17"/>
+          <p:cNvSpPr>
+            <a:spLocks noGrp="1"/>
+          </p:cNvSpPr>
+          <p:nvPr>
+            <p:ph type="ftr" sz="quarter" idx="11"/>
+          </p:nvPr>
+        </p:nvSpPr>
+        <p:spPr/>
+        <p:txBody>
+          <a:bodyPr/>
+          <a:lstStyle/>
+          <a:p>
+            <a:r>
+              <a:rPr lang="pt-BR" dirty="0"/>
+              <a:t>Lincoln Costa / costa@cos.ufrj.br</a:t>
+            </a:r>
+          </a:p>
+        </p:txBody>
+      </p:sp>
+      <p:sp>
+        <p:nvSpPr>
+          <p:cNvPr id="20" name="Slide Number Placeholder 19"/>
+          <p:cNvSpPr>
+            <a:spLocks noGrp="1"/>
+          </p:cNvSpPr>
+          <p:nvPr>
+            <p:ph type="sldNum" sz="quarter" idx="12"/>
+          </p:nvPr>
+        </p:nvSpPr>
+        <p:spPr/>
+        <p:txBody>
+          <a:bodyPr/>
+          <a:lstStyle/>
+          <a:p>
+            <a:fld id="{BB152AAB-E794-4AAE-96FF-3CDB8C5C9FC8}" type="slidenum">
+              <a:rPr lang="pt-BR" smtClean="0"/>
+              <a:pPr/>
+              <a:t>9</a:t>
+            </a:fld>
+            <a:endParaRPr lang="pt-BR" dirty="0"/>
+          </a:p>
+        </p:txBody>
+      </p:sp>
+      <p:sp>
+        <p:nvSpPr>
+          <p:cNvPr id="7" name="Espaço Reservado para Conteúdo 6">
+            <a:extLst>
+              <a:ext uri="{FF2B5EF4-FFF2-40B4-BE49-F238E27FC236}">
+                <a16:creationId xmlns:a16="http://schemas.microsoft.com/office/drawing/2014/main" id="{970ABBE5-C615-480E-84AC-B73FB7BF52AD}"/>
+              </a:ext>
+            </a:extLst>
+          </p:cNvPr>
+          <p:cNvSpPr>
+            <a:spLocks noGrp="1"/>
+          </p:cNvSpPr>
+          <p:nvPr>
+            <p:ph sz="quarter" idx="13"/>
+          </p:nvPr>
+        </p:nvSpPr>
+        <p:spPr/>
+        <p:txBody>
+          <a:bodyPr/>
+          <a:lstStyle/>
+          <a:p>
+            <a:endParaRPr lang="pt-BR"/>
+          </a:p>
+        </p:txBody>
+      </p:sp>
+    </p:spTree>
+    <p:extLst>
+      <p:ext uri="{BB962C8B-B14F-4D97-AF65-F5344CB8AC3E}">
+        <p14:creationId xmlns:p14="http://schemas.microsoft.com/office/powerpoint/2010/main" val="1138997840"/>
       </p:ext>
     </p:extLst>
   </p:cSld>

</xml_diff>